<commit_message>
adding images to Workshop-1. Correcting mistakes in Workshop-2
</commit_message>
<xml_diff>
--- a/ECSE/Workshop-2/programming-1.pptx
+++ b/ECSE/Workshop-2/programming-1.pptx
@@ -838,7 +838,7 @@
           <a:p>
             <a:fld id="{EBDFBFC2-CE20-4704-8BA1-39CBFF4B92DF}" type="datetimeFigureOut">
               <a:rPr lang="en-CA" smtClean="0"/>
-              <a:t>2020-01-19</a:t>
+              <a:t>2020-01-22</a:t>
             </a:fld>
             <a:endParaRPr lang="en-CA"/>
           </a:p>
@@ -1522,7 +1522,7 @@
           <a:p>
             <a:fld id="{CB4ED598-43EB-408A-9236-B45AB4DAC6D0}" type="datetimeFigureOut">
               <a:rPr lang="en-CA" smtClean="0"/>
-              <a:t>2020-01-19</a:t>
+              <a:t>2020-01-22</a:t>
             </a:fld>
             <a:endParaRPr lang="en-CA"/>
           </a:p>
@@ -1722,7 +1722,7 @@
           <a:p>
             <a:fld id="{CB4ED598-43EB-408A-9236-B45AB4DAC6D0}" type="datetimeFigureOut">
               <a:rPr lang="en-CA" smtClean="0"/>
-              <a:t>2020-01-19</a:t>
+              <a:t>2020-01-22</a:t>
             </a:fld>
             <a:endParaRPr lang="en-CA"/>
           </a:p>
@@ -1932,7 +1932,7 @@
           <a:p>
             <a:fld id="{CB4ED598-43EB-408A-9236-B45AB4DAC6D0}" type="datetimeFigureOut">
               <a:rPr lang="en-CA" smtClean="0"/>
-              <a:t>2020-01-19</a:t>
+              <a:t>2020-01-22</a:t>
             </a:fld>
             <a:endParaRPr lang="en-CA"/>
           </a:p>
@@ -2132,7 +2132,7 @@
           <a:p>
             <a:fld id="{CB4ED598-43EB-408A-9236-B45AB4DAC6D0}" type="datetimeFigureOut">
               <a:rPr lang="en-CA" smtClean="0"/>
-              <a:t>2020-01-19</a:t>
+              <a:t>2020-01-22</a:t>
             </a:fld>
             <a:endParaRPr lang="en-CA"/>
           </a:p>
@@ -2408,7 +2408,7 @@
           <a:p>
             <a:fld id="{CB4ED598-43EB-408A-9236-B45AB4DAC6D0}" type="datetimeFigureOut">
               <a:rPr lang="en-CA" smtClean="0"/>
-              <a:t>2020-01-19</a:t>
+              <a:t>2020-01-22</a:t>
             </a:fld>
             <a:endParaRPr lang="en-CA"/>
           </a:p>
@@ -2676,7 +2676,7 @@
           <a:p>
             <a:fld id="{CB4ED598-43EB-408A-9236-B45AB4DAC6D0}" type="datetimeFigureOut">
               <a:rPr lang="en-CA" smtClean="0"/>
-              <a:t>2020-01-19</a:t>
+              <a:t>2020-01-22</a:t>
             </a:fld>
             <a:endParaRPr lang="en-CA"/>
           </a:p>
@@ -3091,7 +3091,7 @@
           <a:p>
             <a:fld id="{CB4ED598-43EB-408A-9236-B45AB4DAC6D0}" type="datetimeFigureOut">
               <a:rPr lang="en-CA" smtClean="0"/>
-              <a:t>2020-01-19</a:t>
+              <a:t>2020-01-22</a:t>
             </a:fld>
             <a:endParaRPr lang="en-CA"/>
           </a:p>
@@ -3233,7 +3233,7 @@
           <a:p>
             <a:fld id="{CB4ED598-43EB-408A-9236-B45AB4DAC6D0}" type="datetimeFigureOut">
               <a:rPr lang="en-CA" smtClean="0"/>
-              <a:t>2020-01-19</a:t>
+              <a:t>2020-01-22</a:t>
             </a:fld>
             <a:endParaRPr lang="en-CA"/>
           </a:p>
@@ -3346,7 +3346,7 @@
           <a:p>
             <a:fld id="{CB4ED598-43EB-408A-9236-B45AB4DAC6D0}" type="datetimeFigureOut">
               <a:rPr lang="en-CA" smtClean="0"/>
-              <a:t>2020-01-19</a:t>
+              <a:t>2020-01-22</a:t>
             </a:fld>
             <a:endParaRPr lang="en-CA"/>
           </a:p>
@@ -3659,7 +3659,7 @@
           <a:p>
             <a:fld id="{CB4ED598-43EB-408A-9236-B45AB4DAC6D0}" type="datetimeFigureOut">
               <a:rPr lang="en-CA" smtClean="0"/>
-              <a:t>2020-01-19</a:t>
+              <a:t>2020-01-22</a:t>
             </a:fld>
             <a:endParaRPr lang="en-CA"/>
           </a:p>
@@ -3948,7 +3948,7 @@
           <a:p>
             <a:fld id="{CB4ED598-43EB-408A-9236-B45AB4DAC6D0}" type="datetimeFigureOut">
               <a:rPr lang="en-CA" smtClean="0"/>
-              <a:t>2020-01-19</a:t>
+              <a:t>2020-01-22</a:t>
             </a:fld>
             <a:endParaRPr lang="en-CA"/>
           </a:p>
@@ -4191,7 +4191,7 @@
           <a:p>
             <a:fld id="{CB4ED598-43EB-408A-9236-B45AB4DAC6D0}" type="datetimeFigureOut">
               <a:rPr lang="en-CA" smtClean="0"/>
-              <a:t>2020-01-19</a:t>
+              <a:t>2020-01-22</a:t>
             </a:fld>
             <a:endParaRPr lang="en-CA"/>
           </a:p>
@@ -8431,9 +8431,16 @@
             <p:ph sz="half" idx="1"/>
           </p:nvPr>
         </p:nvSpPr>
-        <p:spPr/>
+        <p:spPr>
+          <a:xfrm>
+            <a:off x="838200" y="1825624"/>
+            <a:ext cx="4817012" cy="4181281"/>
+          </a:xfrm>
+        </p:spPr>
         <p:txBody>
-          <a:bodyPr/>
+          <a:bodyPr>
+            <a:normAutofit fontScale="92500"/>
+          </a:bodyPr>
           <a:lstStyle/>
           <a:p>
             <a:pPr marL="0" indent="0">
@@ -8527,7 +8534,9 @@
         </p:nvSpPr>
         <p:spPr/>
         <p:txBody>
-          <a:bodyPr/>
+          <a:bodyPr>
+            <a:normAutofit fontScale="92500"/>
+          </a:bodyPr>
           <a:lstStyle/>
           <a:p>
             <a:pPr marL="0" indent="0">
@@ -8639,7 +8648,7 @@
           <a:p>
             <a:r>
               <a:rPr lang="en-CA" dirty="0"/>
-              <a:t>string literals</a:t>
+              <a:t>Format specifiers</a:t>
             </a:r>
           </a:p>
         </p:txBody>

</xml_diff>

<commit_message>
near final edits to workshops. filling in details. Adding comments to example code
</commit_message>
<xml_diff>
--- a/ECSE/Workshop-2/programming-1.pptx
+++ b/ECSE/Workshop-2/programming-1.pptx
@@ -17,12 +17,12 @@
     <p:sldId id="270" r:id="rId8"/>
     <p:sldId id="267" r:id="rId9"/>
     <p:sldId id="268" r:id="rId10"/>
-    <p:sldId id="269" r:id="rId11"/>
-    <p:sldId id="271" r:id="rId12"/>
-    <p:sldId id="272" r:id="rId13"/>
-    <p:sldId id="273" r:id="rId14"/>
-    <p:sldId id="274" r:id="rId15"/>
-    <p:sldId id="275" r:id="rId16"/>
+    <p:sldId id="271" r:id="rId11"/>
+    <p:sldId id="273" r:id="rId12"/>
+    <p:sldId id="269" r:id="rId13"/>
+    <p:sldId id="274" r:id="rId14"/>
+    <p:sldId id="275" r:id="rId15"/>
+    <p:sldId id="272" r:id="rId16"/>
     <p:sldId id="276" r:id="rId17"/>
     <p:sldId id="277" r:id="rId18"/>
     <p:sldId id="278" r:id="rId19"/>
@@ -838,7 +838,7 @@
           <a:p>
             <a:fld id="{EBDFBFC2-CE20-4704-8BA1-39CBFF4B92DF}" type="datetimeFigureOut">
               <a:rPr lang="en-CA" smtClean="0"/>
-              <a:t>2020-01-22</a:t>
+              <a:t>2020-01-25</a:t>
             </a:fld>
             <a:endParaRPr lang="en-CA"/>
           </a:p>
@@ -1239,14 +1239,8 @@
           <a:p>
             <a:r>
               <a:rPr lang="en-CA" dirty="0"/>
-              <a:t>You include libraries to define functions and constants that other programmers have written before you.</a:t>
-            </a:r>
-          </a:p>
-          <a:p>
-            <a:endParaRPr lang="en-CA" dirty="0"/>
-          </a:p>
-          <a:p>
-            <a:endParaRPr lang="en-CA" dirty="0"/>
+              <a:t>Don’t need to add the else statement if you don’t need it</a:t>
+            </a:r>
           </a:p>
         </p:txBody>
       </p:sp>
@@ -1267,7 +1261,7 @@
           <a:p>
             <a:fld id="{7F730BB3-4387-46E3-911B-458B2897A22B}" type="slidenum">
               <a:rPr lang="en-CA" smtClean="0"/>
-              <a:t>12</a:t>
+              <a:t>11</a:t>
             </a:fld>
             <a:endParaRPr lang="en-CA"/>
           </a:p>
@@ -1276,7 +1270,7 @@
     </p:spTree>
     <p:extLst>
       <p:ext uri="{BB962C8B-B14F-4D97-AF65-F5344CB8AC3E}">
-        <p14:creationId xmlns:p14="http://schemas.microsoft.com/office/powerpoint/2010/main" val="1639123831"/>
+        <p14:creationId xmlns:p14="http://schemas.microsoft.com/office/powerpoint/2010/main" val="2132115844"/>
       </p:ext>
     </p:extLst>
   </p:cSld>
@@ -1332,8 +1326,14 @@
           <a:p>
             <a:r>
               <a:rPr lang="en-CA" dirty="0"/>
-              <a:t>Don’t need to add the else statement if you don’t need it</a:t>
-            </a:r>
+              <a:t>You include libraries to define functions and constants that other programmers have written before you.</a:t>
+            </a:r>
+          </a:p>
+          <a:p>
+            <a:endParaRPr lang="en-CA" dirty="0"/>
+          </a:p>
+          <a:p>
+            <a:endParaRPr lang="en-CA" dirty="0"/>
           </a:p>
         </p:txBody>
       </p:sp>
@@ -1354,7 +1354,7 @@
           <a:p>
             <a:fld id="{7F730BB3-4387-46E3-911B-458B2897A22B}" type="slidenum">
               <a:rPr lang="en-CA" smtClean="0"/>
-              <a:t>13</a:t>
+              <a:t>15</a:t>
             </a:fld>
             <a:endParaRPr lang="en-CA"/>
           </a:p>
@@ -1363,7 +1363,7 @@
     </p:spTree>
     <p:extLst>
       <p:ext uri="{BB962C8B-B14F-4D97-AF65-F5344CB8AC3E}">
-        <p14:creationId xmlns:p14="http://schemas.microsoft.com/office/powerpoint/2010/main" val="2132115844"/>
+        <p14:creationId xmlns:p14="http://schemas.microsoft.com/office/powerpoint/2010/main" val="1639123831"/>
       </p:ext>
     </p:extLst>
   </p:cSld>
@@ -1522,7 +1522,7 @@
           <a:p>
             <a:fld id="{CB4ED598-43EB-408A-9236-B45AB4DAC6D0}" type="datetimeFigureOut">
               <a:rPr lang="en-CA" smtClean="0"/>
-              <a:t>2020-01-22</a:t>
+              <a:t>2020-01-25</a:t>
             </a:fld>
             <a:endParaRPr lang="en-CA"/>
           </a:p>
@@ -1722,7 +1722,7 @@
           <a:p>
             <a:fld id="{CB4ED598-43EB-408A-9236-B45AB4DAC6D0}" type="datetimeFigureOut">
               <a:rPr lang="en-CA" smtClean="0"/>
-              <a:t>2020-01-22</a:t>
+              <a:t>2020-01-25</a:t>
             </a:fld>
             <a:endParaRPr lang="en-CA"/>
           </a:p>
@@ -1932,7 +1932,7 @@
           <a:p>
             <a:fld id="{CB4ED598-43EB-408A-9236-B45AB4DAC6D0}" type="datetimeFigureOut">
               <a:rPr lang="en-CA" smtClean="0"/>
-              <a:t>2020-01-22</a:t>
+              <a:t>2020-01-25</a:t>
             </a:fld>
             <a:endParaRPr lang="en-CA"/>
           </a:p>
@@ -2022,6 +2022,114 @@
           <a:chExt cx="0" cy="0"/>
         </a:xfrm>
       </p:grpSpPr>
+      <p:grpSp>
+        <p:nvGrpSpPr>
+          <p:cNvPr id="10" name="Group 9">
+            <a:extLst>
+              <a:ext uri="{FF2B5EF4-FFF2-40B4-BE49-F238E27FC236}">
+                <a16:creationId xmlns:a16="http://schemas.microsoft.com/office/drawing/2014/main" id="{EAE59A4D-C1DC-4F73-A891-20A0D56A9C44}"/>
+              </a:ext>
+            </a:extLst>
+          </p:cNvPr>
+          <p:cNvGrpSpPr/>
+          <p:nvPr userDrawn="1"/>
+        </p:nvGrpSpPr>
+        <p:grpSpPr>
+          <a:xfrm>
+            <a:off x="0" y="339000"/>
+            <a:ext cx="8406063" cy="1480905"/>
+            <a:chOff x="0" y="352062"/>
+            <a:chExt cx="8406063" cy="1480905"/>
+          </a:xfrm>
+        </p:grpSpPr>
+        <p:pic>
+          <p:nvPicPr>
+            <p:cNvPr id="7" name="Google Shape;66;p2" descr="A close up of a logo&#10;&#10;Description automatically generated">
+              <a:extLst>
+                <a:ext uri="{FF2B5EF4-FFF2-40B4-BE49-F238E27FC236}">
+                  <a16:creationId xmlns:a16="http://schemas.microsoft.com/office/drawing/2014/main" id="{E894E2FD-0B81-44AF-955F-4A8C4E0F5788}"/>
+                </a:ext>
+              </a:extLst>
+            </p:cNvPr>
+            <p:cNvPicPr preferRelativeResize="0"/>
+            <p:nvPr userDrawn="1"/>
+          </p:nvPicPr>
+          <p:blipFill rotWithShape="1">
+            <a:blip r:embed="rId2">
+              <a:alphaModFix/>
+            </a:blip>
+            <a:srcRect/>
+            <a:stretch/>
+          </p:blipFill>
+          <p:spPr>
+            <a:xfrm>
+              <a:off x="0" y="352062"/>
+              <a:ext cx="8406063" cy="1480905"/>
+            </a:xfrm>
+            <a:prstGeom prst="rect">
+              <a:avLst/>
+            </a:prstGeom>
+            <a:solidFill>
+              <a:srgbClr val="FFFFFF"/>
+            </a:solidFill>
+            <a:ln>
+              <a:noFill/>
+            </a:ln>
+          </p:spPr>
+        </p:pic>
+        <p:sp>
+          <p:nvSpPr>
+            <p:cNvPr id="9" name="Rectangle 8">
+              <a:extLst>
+                <a:ext uri="{FF2B5EF4-FFF2-40B4-BE49-F238E27FC236}">
+                  <a16:creationId xmlns:a16="http://schemas.microsoft.com/office/drawing/2014/main" id="{1880D4AF-928D-4D9C-B146-3E8B6826CDA3}"/>
+                </a:ext>
+              </a:extLst>
+            </p:cNvPr>
+            <p:cNvSpPr/>
+            <p:nvPr userDrawn="1"/>
+          </p:nvSpPr>
+          <p:spPr>
+            <a:xfrm>
+              <a:off x="5525589" y="438894"/>
+              <a:ext cx="2416628" cy="1307239"/>
+            </a:xfrm>
+            <a:prstGeom prst="rect">
+              <a:avLst/>
+            </a:prstGeom>
+            <a:solidFill>
+              <a:srgbClr val="E0E0E0"/>
+            </a:solidFill>
+            <a:ln>
+              <a:noFill/>
+            </a:ln>
+          </p:spPr>
+          <p:style>
+            <a:lnRef idx="2">
+              <a:schemeClr val="accent1">
+                <a:shade val="50000"/>
+              </a:schemeClr>
+            </a:lnRef>
+            <a:fillRef idx="1">
+              <a:schemeClr val="accent1"/>
+            </a:fillRef>
+            <a:effectRef idx="0">
+              <a:schemeClr val="accent1"/>
+            </a:effectRef>
+            <a:fontRef idx="minor">
+              <a:schemeClr val="lt1"/>
+            </a:fontRef>
+          </p:style>
+          <p:txBody>
+            <a:bodyPr rtlCol="0" anchor="ctr"/>
+            <a:lstStyle/>
+            <a:p>
+              <a:pPr algn="ctr"/>
+              <a:endParaRPr lang="en-CA"/>
+            </a:p>
+          </p:txBody>
+        </p:sp>
+      </p:grpSp>
       <p:sp>
         <p:nvSpPr>
           <p:cNvPr id="2" name="Title 1">
@@ -2038,16 +2146,21 @@
             <p:ph type="title"/>
           </p:nvPr>
         </p:nvSpPr>
-        <p:spPr/>
+        <p:spPr>
+          <a:xfrm>
+            <a:off x="3370216" y="365125"/>
+            <a:ext cx="4572001" cy="1460500"/>
+          </a:xfrm>
+        </p:spPr>
         <p:txBody>
           <a:bodyPr/>
           <a:lstStyle/>
           <a:p>
             <a:r>
-              <a:rPr lang="en-US"/>
+              <a:rPr lang="en-US" dirty="0"/>
               <a:t>Click to edit Master title style</a:t>
             </a:r>
-            <a:endParaRPr lang="en-CA"/>
+            <a:endParaRPr lang="en-CA" dirty="0"/>
           </a:p>
         </p:txBody>
       </p:sp>
@@ -2067,7 +2180,12 @@
             <p:ph idx="1"/>
           </p:nvPr>
         </p:nvSpPr>
-        <p:spPr/>
+        <p:spPr>
+          <a:xfrm>
+            <a:off x="838200" y="1864814"/>
+            <a:ext cx="10515600" cy="4351338"/>
+          </a:xfrm>
+        </p:spPr>
         <p:txBody>
           <a:bodyPr/>
           <a:lstStyle/>
@@ -2132,7 +2250,7 @@
           <a:p>
             <a:fld id="{CB4ED598-43EB-408A-9236-B45AB4DAC6D0}" type="datetimeFigureOut">
               <a:rPr lang="en-CA" smtClean="0"/>
-              <a:t>2020-01-22</a:t>
+              <a:t>2020-01-25</a:t>
             </a:fld>
             <a:endParaRPr lang="en-CA"/>
           </a:p>
@@ -2408,7 +2526,7 @@
           <a:p>
             <a:fld id="{CB4ED598-43EB-408A-9236-B45AB4DAC6D0}" type="datetimeFigureOut">
               <a:rPr lang="en-CA" smtClean="0"/>
-              <a:t>2020-01-22</a:t>
+              <a:t>2020-01-25</a:t>
             </a:fld>
             <a:endParaRPr lang="en-CA"/>
           </a:p>
@@ -2498,6 +2616,114 @@
           <a:chExt cx="0" cy="0"/>
         </a:xfrm>
       </p:grpSpPr>
+      <p:grpSp>
+        <p:nvGrpSpPr>
+          <p:cNvPr id="8" name="Group 7">
+            <a:extLst>
+              <a:ext uri="{FF2B5EF4-FFF2-40B4-BE49-F238E27FC236}">
+                <a16:creationId xmlns:a16="http://schemas.microsoft.com/office/drawing/2014/main" id="{045469D8-606B-49DC-854A-B37C0BD06701}"/>
+              </a:ext>
+            </a:extLst>
+          </p:cNvPr>
+          <p:cNvGrpSpPr/>
+          <p:nvPr userDrawn="1"/>
+        </p:nvGrpSpPr>
+        <p:grpSpPr>
+          <a:xfrm>
+            <a:off x="0" y="352062"/>
+            <a:ext cx="8406063" cy="1480905"/>
+            <a:chOff x="0" y="352062"/>
+            <a:chExt cx="8406063" cy="1480905"/>
+          </a:xfrm>
+        </p:grpSpPr>
+        <p:pic>
+          <p:nvPicPr>
+            <p:cNvPr id="9" name="Google Shape;66;p2" descr="A close up of a logo&#10;&#10;Description automatically generated">
+              <a:extLst>
+                <a:ext uri="{FF2B5EF4-FFF2-40B4-BE49-F238E27FC236}">
+                  <a16:creationId xmlns:a16="http://schemas.microsoft.com/office/drawing/2014/main" id="{5C669B40-1D01-4289-9FF8-B5154DC115E7}"/>
+                </a:ext>
+              </a:extLst>
+            </p:cNvPr>
+            <p:cNvPicPr preferRelativeResize="0"/>
+            <p:nvPr userDrawn="1"/>
+          </p:nvPicPr>
+          <p:blipFill rotWithShape="1">
+            <a:blip r:embed="rId2">
+              <a:alphaModFix/>
+            </a:blip>
+            <a:srcRect/>
+            <a:stretch/>
+          </p:blipFill>
+          <p:spPr>
+            <a:xfrm>
+              <a:off x="0" y="352062"/>
+              <a:ext cx="8406063" cy="1480905"/>
+            </a:xfrm>
+            <a:prstGeom prst="rect">
+              <a:avLst/>
+            </a:prstGeom>
+            <a:solidFill>
+              <a:srgbClr val="FFFFFF"/>
+            </a:solidFill>
+            <a:ln>
+              <a:noFill/>
+            </a:ln>
+          </p:spPr>
+        </p:pic>
+        <p:sp>
+          <p:nvSpPr>
+            <p:cNvPr id="10" name="Rectangle 9">
+              <a:extLst>
+                <a:ext uri="{FF2B5EF4-FFF2-40B4-BE49-F238E27FC236}">
+                  <a16:creationId xmlns:a16="http://schemas.microsoft.com/office/drawing/2014/main" id="{4F9192BA-38AB-420A-AA1D-CFE5FFC8B1AE}"/>
+                </a:ext>
+              </a:extLst>
+            </p:cNvPr>
+            <p:cNvSpPr/>
+            <p:nvPr userDrawn="1"/>
+          </p:nvSpPr>
+          <p:spPr>
+            <a:xfrm>
+              <a:off x="5525589" y="438894"/>
+              <a:ext cx="2416628" cy="1307239"/>
+            </a:xfrm>
+            <a:prstGeom prst="rect">
+              <a:avLst/>
+            </a:prstGeom>
+            <a:solidFill>
+              <a:srgbClr val="E0E0E0"/>
+            </a:solidFill>
+            <a:ln>
+              <a:noFill/>
+            </a:ln>
+          </p:spPr>
+          <p:style>
+            <a:lnRef idx="2">
+              <a:schemeClr val="accent1">
+                <a:shade val="50000"/>
+              </a:schemeClr>
+            </a:lnRef>
+            <a:fillRef idx="1">
+              <a:schemeClr val="accent1"/>
+            </a:fillRef>
+            <a:effectRef idx="0">
+              <a:schemeClr val="accent1"/>
+            </a:effectRef>
+            <a:fontRef idx="minor">
+              <a:schemeClr val="lt1"/>
+            </a:fontRef>
+          </p:style>
+          <p:txBody>
+            <a:bodyPr rtlCol="0" anchor="ctr"/>
+            <a:lstStyle/>
+            <a:p>
+              <a:pPr algn="ctr"/>
+              <a:endParaRPr lang="en-CA"/>
+            </a:p>
+          </p:txBody>
+        </p:sp>
+      </p:grpSp>
       <p:sp>
         <p:nvSpPr>
           <p:cNvPr id="2" name="Title 1">
@@ -2514,7 +2740,12 @@
             <p:ph type="title"/>
           </p:nvPr>
         </p:nvSpPr>
-        <p:spPr/>
+        <p:spPr>
+          <a:xfrm>
+            <a:off x="3396342" y="365125"/>
+            <a:ext cx="4545875" cy="1460500"/>
+          </a:xfrm>
+        </p:spPr>
         <p:txBody>
           <a:bodyPr/>
           <a:lstStyle/>
@@ -2555,38 +2786,38 @@
           <a:p>
             <a:pPr lvl="0"/>
             <a:r>
-              <a:rPr lang="en-US"/>
+              <a:rPr lang="en-US" dirty="0"/>
               <a:t>Click to edit Master text styles</a:t>
             </a:r>
           </a:p>
           <a:p>
             <a:pPr lvl="1"/>
             <a:r>
-              <a:rPr lang="en-US"/>
+              <a:rPr lang="en-US" dirty="0"/>
               <a:t>Second level</a:t>
             </a:r>
           </a:p>
           <a:p>
             <a:pPr lvl="2"/>
             <a:r>
-              <a:rPr lang="en-US"/>
+              <a:rPr lang="en-US" dirty="0"/>
               <a:t>Third level</a:t>
             </a:r>
           </a:p>
           <a:p>
             <a:pPr lvl="3"/>
             <a:r>
-              <a:rPr lang="en-US"/>
+              <a:rPr lang="en-US" dirty="0"/>
               <a:t>Fourth level</a:t>
             </a:r>
           </a:p>
           <a:p>
             <a:pPr lvl="4"/>
             <a:r>
-              <a:rPr lang="en-US"/>
+              <a:rPr lang="en-US" dirty="0"/>
               <a:t>Fifth level</a:t>
             </a:r>
-            <a:endParaRPr lang="en-CA"/>
+            <a:endParaRPr lang="en-CA" dirty="0"/>
           </a:p>
         </p:txBody>
       </p:sp>
@@ -2676,7 +2907,7 @@
           <a:p>
             <a:fld id="{CB4ED598-43EB-408A-9236-B45AB4DAC6D0}" type="datetimeFigureOut">
               <a:rPr lang="en-CA" smtClean="0"/>
-              <a:t>2020-01-22</a:t>
+              <a:t>2020-01-25</a:t>
             </a:fld>
             <a:endParaRPr lang="en-CA"/>
           </a:p>
@@ -3091,7 +3322,7 @@
           <a:p>
             <a:fld id="{CB4ED598-43EB-408A-9236-B45AB4DAC6D0}" type="datetimeFigureOut">
               <a:rPr lang="en-CA" smtClean="0"/>
-              <a:t>2020-01-22</a:t>
+              <a:t>2020-01-25</a:t>
             </a:fld>
             <a:endParaRPr lang="en-CA"/>
           </a:p>
@@ -3233,7 +3464,7 @@
           <a:p>
             <a:fld id="{CB4ED598-43EB-408A-9236-B45AB4DAC6D0}" type="datetimeFigureOut">
               <a:rPr lang="en-CA" smtClean="0"/>
-              <a:t>2020-01-22</a:t>
+              <a:t>2020-01-25</a:t>
             </a:fld>
             <a:endParaRPr lang="en-CA"/>
           </a:p>
@@ -3346,7 +3577,7 @@
           <a:p>
             <a:fld id="{CB4ED598-43EB-408A-9236-B45AB4DAC6D0}" type="datetimeFigureOut">
               <a:rPr lang="en-CA" smtClean="0"/>
-              <a:t>2020-01-22</a:t>
+              <a:t>2020-01-25</a:t>
             </a:fld>
             <a:endParaRPr lang="en-CA"/>
           </a:p>
@@ -3659,7 +3890,7 @@
           <a:p>
             <a:fld id="{CB4ED598-43EB-408A-9236-B45AB4DAC6D0}" type="datetimeFigureOut">
               <a:rPr lang="en-CA" smtClean="0"/>
-              <a:t>2020-01-22</a:t>
+              <a:t>2020-01-25</a:t>
             </a:fld>
             <a:endParaRPr lang="en-CA"/>
           </a:p>
@@ -3948,7 +4179,7 @@
           <a:p>
             <a:fld id="{CB4ED598-43EB-408A-9236-B45AB4DAC6D0}" type="datetimeFigureOut">
               <a:rPr lang="en-CA" smtClean="0"/>
-              <a:t>2020-01-22</a:t>
+              <a:t>2020-01-25</a:t>
             </a:fld>
             <a:endParaRPr lang="en-CA"/>
           </a:p>
@@ -4191,7 +4422,7 @@
           <a:p>
             <a:fld id="{CB4ED598-43EB-408A-9236-B45AB4DAC6D0}" type="datetimeFigureOut">
               <a:rPr lang="en-CA" smtClean="0"/>
-              <a:t>2020-01-22</a:t>
+              <a:t>2020-01-25</a:t>
             </a:fld>
             <a:endParaRPr lang="en-CA"/>
           </a:p>
@@ -4594,6 +4825,14 @@
 <file path=ppt/slides/slide1.xml><?xml version="1.0" encoding="utf-8"?>
 <p:sld xmlns:a="http://schemas.openxmlformats.org/drawingml/2006/main" xmlns:r="http://schemas.openxmlformats.org/officeDocument/2006/relationships" xmlns:p="http://schemas.openxmlformats.org/presentationml/2006/main">
   <p:cSld>
+    <p:bg>
+      <p:bgPr>
+        <a:solidFill>
+          <a:schemeClr val="bg1"/>
+        </a:solidFill>
+        <a:effectLst/>
+      </p:bgPr>
+    </p:bg>
     <p:spTree>
       <p:nvGrpSpPr>
         <p:cNvPr id="1" name=""/>
@@ -4608,6 +4847,177 @@
           <a:chExt cx="0" cy="0"/>
         </a:xfrm>
       </p:grpSpPr>
+      <p:pic>
+        <p:nvPicPr>
+          <p:cNvPr id="5" name="Picture 4">
+            <a:extLst>
+              <a:ext uri="{FF2B5EF4-FFF2-40B4-BE49-F238E27FC236}">
+                <a16:creationId xmlns:a16="http://schemas.microsoft.com/office/drawing/2014/main" id="{64632438-DD92-4348-9602-4C339F9B3E22}"/>
+              </a:ext>
+            </a:extLst>
+          </p:cNvPr>
+          <p:cNvPicPr>
+            <a:picLocks noChangeAspect="1"/>
+          </p:cNvPicPr>
+          <p:nvPr/>
+        </p:nvPicPr>
+        <p:blipFill rotWithShape="1">
+          <a:blip r:embed="rId2"/>
+          <a:srcRect t="15730"/>
+          <a:stretch/>
+        </p:blipFill>
+        <p:spPr>
+          <a:xfrm>
+            <a:off x="20" y="10"/>
+            <a:ext cx="12191980" cy="6857990"/>
+          </a:xfrm>
+          <a:prstGeom prst="rect">
+            <a:avLst/>
+          </a:prstGeom>
+        </p:spPr>
+      </p:pic>
+      <p:sp>
+        <p:nvSpPr>
+          <p:cNvPr id="9" name="Freeform 5">
+            <a:extLst>
+              <a:ext uri="{FF2B5EF4-FFF2-40B4-BE49-F238E27FC236}">
+                <a16:creationId xmlns:a16="http://schemas.microsoft.com/office/drawing/2014/main" id="{87CC2527-562A-4F69-B487-4371E5B243E7}"/>
+              </a:ext>
+              <a:ext uri="{C183D7F6-B498-43B3-948B-1728B52AA6E4}">
+                <adec:decorative xmlns:adec="http://schemas.microsoft.com/office/drawing/2017/decorative" val="1"/>
+              </a:ext>
+            </a:extLst>
+          </p:cNvPr>
+          <p:cNvSpPr>
+            <a:spLocks noGrp="1" noRot="1" noChangeAspect="1" noMove="1" noResize="1" noEditPoints="1" noAdjustHandles="1" noChangeArrowheads="1" noChangeShapeType="1" noTextEdit="1"/>
+          </p:cNvSpPr>
+          <p:nvPr>
+            <p:extLst>
+              <p:ext uri="{386F3935-93C4-4BCD-93E2-E3B085C9AB24}">
+                <p16:designElem xmlns:p16="http://schemas.microsoft.com/office/powerpoint/2015/main" val="1"/>
+              </p:ext>
+            </p:extLst>
+          </p:nvPr>
+        </p:nvSpPr>
+        <p:spPr bwMode="grayWhite">
+          <a:xfrm>
+            <a:off x="7488621" y="2277613"/>
+            <a:ext cx="4703379" cy="4580387"/>
+          </a:xfrm>
+          <a:custGeom>
+            <a:avLst/>
+            <a:gdLst>
+              <a:gd name="T0" fmla="*/ 1333 w 1333"/>
+              <a:gd name="T1" fmla="*/ 1031 h 1298"/>
+              <a:gd name="T2" fmla="*/ 1333 w 1333"/>
+              <a:gd name="T3" fmla="*/ 380 h 1298"/>
+              <a:gd name="T4" fmla="*/ 706 w 1333"/>
+              <a:gd name="T5" fmla="*/ 0 h 1298"/>
+              <a:gd name="T6" fmla="*/ 0 w 1333"/>
+              <a:gd name="T7" fmla="*/ 706 h 1298"/>
+              <a:gd name="T8" fmla="*/ 323 w 1333"/>
+              <a:gd name="T9" fmla="*/ 1298 h 1298"/>
+              <a:gd name="T10" fmla="*/ 1090 w 1333"/>
+              <a:gd name="T11" fmla="*/ 1298 h 1298"/>
+              <a:gd name="T12" fmla="*/ 1333 w 1333"/>
+              <a:gd name="T13" fmla="*/ 1031 h 1298"/>
+            </a:gdLst>
+            <a:ahLst/>
+            <a:cxnLst>
+              <a:cxn ang="0">
+                <a:pos x="T0" y="T1"/>
+              </a:cxn>
+              <a:cxn ang="0">
+                <a:pos x="T2" y="T3"/>
+              </a:cxn>
+              <a:cxn ang="0">
+                <a:pos x="T4" y="T5"/>
+              </a:cxn>
+              <a:cxn ang="0">
+                <a:pos x="T6" y="T7"/>
+              </a:cxn>
+              <a:cxn ang="0">
+                <a:pos x="T8" y="T9"/>
+              </a:cxn>
+              <a:cxn ang="0">
+                <a:pos x="T10" y="T11"/>
+              </a:cxn>
+              <a:cxn ang="0">
+                <a:pos x="T12" y="T13"/>
+              </a:cxn>
+            </a:cxnLst>
+            <a:rect l="0" t="0" r="r" b="b"/>
+            <a:pathLst>
+              <a:path w="1333" h="1298">
+                <a:moveTo>
+                  <a:pt x="1333" y="1031"/>
+                </a:moveTo>
+                <a:cubicBezTo>
+                  <a:pt x="1333" y="380"/>
+                  <a:pt x="1333" y="380"/>
+                  <a:pt x="1333" y="380"/>
+                </a:cubicBezTo>
+                <a:cubicBezTo>
+                  <a:pt x="1215" y="154"/>
+                  <a:pt x="979" y="0"/>
+                  <a:pt x="706" y="0"/>
+                </a:cubicBezTo>
+                <a:cubicBezTo>
+                  <a:pt x="317" y="0"/>
+                  <a:pt x="0" y="316"/>
+                  <a:pt x="0" y="706"/>
+                </a:cubicBezTo>
+                <a:cubicBezTo>
+                  <a:pt x="0" y="954"/>
+                  <a:pt x="129" y="1172"/>
+                  <a:pt x="323" y="1298"/>
+                </a:cubicBezTo>
+                <a:cubicBezTo>
+                  <a:pt x="1090" y="1298"/>
+                  <a:pt x="1090" y="1298"/>
+                  <a:pt x="1090" y="1298"/>
+                </a:cubicBezTo>
+                <a:cubicBezTo>
+                  <a:pt x="1193" y="1232"/>
+                  <a:pt x="1276" y="1140"/>
+                  <a:pt x="1333" y="1031"/>
+                </a:cubicBezTo>
+                <a:close/>
+              </a:path>
+            </a:pathLst>
+          </a:custGeom>
+          <a:solidFill>
+            <a:schemeClr val="bg1">
+              <a:alpha val="70000"/>
+            </a:schemeClr>
+          </a:solidFill>
+          <a:ln w="50800" cap="sq" cmpd="dbl">
+            <a:noFill/>
+            <a:miter lim="800000"/>
+          </a:ln>
+          <a:effectLst/>
+        </p:spPr>
+        <p:txBody>
+          <a:bodyPr vert="horz" lIns="91440" tIns="45720" rIns="91440" bIns="45720" rtlCol="0" anchor="t">
+            <a:normAutofit/>
+          </a:bodyPr>
+          <a:lstStyle/>
+          <a:p>
+            <a:pPr algn="ctr">
+              <a:spcAft>
+                <a:spcPts val="1000"/>
+              </a:spcAft>
+              <a:buClr>
+                <a:schemeClr val="tx1"/>
+              </a:buClr>
+              <a:buSzPct val="100000"/>
+              <a:buFont typeface="Arial"/>
+              <a:buNone/>
+            </a:pPr>
+            <a:endParaRPr lang="en-US" sz="1600" cap="all"/>
+          </a:p>
+        </p:txBody>
+      </p:sp>
       <p:sp>
         <p:nvSpPr>
           <p:cNvPr id="2" name="Title 1">
@@ -4626,8 +5036,8 @@
         </p:nvSpPr>
         <p:spPr>
           <a:xfrm>
-            <a:off x="1524000" y="1122363"/>
-            <a:ext cx="9144000" cy="3052072"/>
+            <a:off x="8022021" y="3231931"/>
+            <a:ext cx="3852041" cy="1834056"/>
           </a:xfrm>
         </p:spPr>
         <p:txBody>
@@ -4637,7 +5047,7 @@
           <a:lstStyle/>
           <a:p>
             <a:r>
-              <a:rPr lang="en-US" dirty="0"/>
+              <a:rPr lang="en-US" sz="4000"/>
               <a:t>Workshop 2: Programming intuition</a:t>
             </a:r>
           </a:p>
@@ -4661,18 +5071,76 @@
         </p:nvSpPr>
         <p:spPr>
           <a:xfrm>
-            <a:off x="1524000" y="4320208"/>
-            <a:ext cx="9144000" cy="937591"/>
+            <a:off x="7782910" y="5242675"/>
+            <a:ext cx="4330262" cy="683284"/>
           </a:xfrm>
         </p:spPr>
         <p:txBody>
-          <a:bodyPr/>
+          <a:bodyPr>
+            <a:normAutofit/>
+          </a:bodyPr>
           <a:lstStyle/>
           <a:p>
-            <a:endParaRPr lang="en-CA" dirty="0"/>
+            <a:endParaRPr lang="en-CA" sz="2000"/>
           </a:p>
         </p:txBody>
       </p:sp>
+      <p:cxnSp>
+        <p:nvCxnSpPr>
+          <p:cNvPr id="11" name="Straight Connector 10">
+            <a:extLst>
+              <a:ext uri="{FF2B5EF4-FFF2-40B4-BE49-F238E27FC236}">
+                <a16:creationId xmlns:a16="http://schemas.microsoft.com/office/drawing/2014/main" id="{BCDAEC91-5BCE-4B55-9CC0-43EF94CB734B}"/>
+              </a:ext>
+              <a:ext uri="{C183D7F6-B498-43B3-948B-1728B52AA6E4}">
+                <adec:decorative xmlns:adec="http://schemas.microsoft.com/office/drawing/2017/decorative" val="1"/>
+              </a:ext>
+            </a:extLst>
+          </p:cNvPr>
+          <p:cNvCxnSpPr>
+            <a:cxnSpLocks noGrp="1" noRot="1" noChangeAspect="1" noMove="1" noResize="1" noEditPoints="1" noAdjustHandles="1" noChangeArrowheads="1" noChangeShapeType="1"/>
+          </p:cNvCxnSpPr>
+          <p:nvPr>
+            <p:extLst>
+              <p:ext uri="{386F3935-93C4-4BCD-93E2-E3B085C9AB24}">
+                <p16:designElem xmlns:p16="http://schemas.microsoft.com/office/powerpoint/2015/main" val="1"/>
+              </p:ext>
+            </p:extLst>
+          </p:nvPr>
+        </p:nvCxnSpPr>
+        <p:spPr>
+          <a:xfrm>
+            <a:off x="9480331" y="5123793"/>
+            <a:ext cx="935420" cy="0"/>
+          </a:xfrm>
+          <a:prstGeom prst="line">
+            <a:avLst/>
+          </a:prstGeom>
+          <a:ln w="25400" cap="sq">
+            <a:solidFill>
+              <a:schemeClr val="tx1">
+                <a:lumMod val="85000"/>
+                <a:lumOff val="15000"/>
+              </a:schemeClr>
+            </a:solidFill>
+            <a:bevel/>
+          </a:ln>
+        </p:spPr>
+        <p:style>
+          <a:lnRef idx="1">
+            <a:schemeClr val="accent1"/>
+          </a:lnRef>
+          <a:fillRef idx="0">
+            <a:schemeClr val="accent1"/>
+          </a:fillRef>
+          <a:effectRef idx="0">
+            <a:schemeClr val="accent1"/>
+          </a:effectRef>
+          <a:fontRef idx="minor">
+            <a:schemeClr val="tx1"/>
+          </a:fontRef>
+        </p:style>
+      </p:cxnSp>
     </p:spTree>
     <p:extLst>
       <p:ext uri="{BB962C8B-B14F-4D97-AF65-F5344CB8AC3E}">
@@ -4708,6 +5176,605 @@
           <p:cNvPr id="2" name="Title 1">
             <a:extLst>
               <a:ext uri="{FF2B5EF4-FFF2-40B4-BE49-F238E27FC236}">
+                <a16:creationId xmlns:a16="http://schemas.microsoft.com/office/drawing/2014/main" id="{BF57B442-50D3-4989-A0DF-3064765DEBE7}"/>
+              </a:ext>
+            </a:extLst>
+          </p:cNvPr>
+          <p:cNvSpPr>
+            <a:spLocks noGrp="1"/>
+          </p:cNvSpPr>
+          <p:nvPr>
+            <p:ph type="title"/>
+          </p:nvPr>
+        </p:nvSpPr>
+        <p:spPr/>
+        <p:txBody>
+          <a:bodyPr/>
+          <a:lstStyle/>
+          <a:p>
+            <a:r>
+              <a:rPr lang="en-CA" dirty="0"/>
+              <a:t>Programming in a nutshell…</a:t>
+            </a:r>
+          </a:p>
+        </p:txBody>
+      </p:sp>
+      <p:sp>
+        <p:nvSpPr>
+          <p:cNvPr id="3" name="Content Placeholder 2">
+            <a:extLst>
+              <a:ext uri="{FF2B5EF4-FFF2-40B4-BE49-F238E27FC236}">
+                <a16:creationId xmlns:a16="http://schemas.microsoft.com/office/drawing/2014/main" id="{2AEB2B98-FF3D-4A3C-8526-44B7EEB21B00}"/>
+              </a:ext>
+            </a:extLst>
+          </p:cNvPr>
+          <p:cNvSpPr>
+            <a:spLocks noGrp="1"/>
+          </p:cNvSpPr>
+          <p:nvPr>
+            <p:ph idx="1"/>
+          </p:nvPr>
+        </p:nvSpPr>
+        <p:spPr/>
+        <p:txBody>
+          <a:bodyPr>
+            <a:normAutofit fontScale="92500"/>
+          </a:bodyPr>
+          <a:lstStyle/>
+          <a:p>
+            <a:r>
+              <a:rPr lang="en-CA" dirty="0"/>
+              <a:t>Write commands that the computer can </a:t>
+            </a:r>
+            <a:r>
+              <a:rPr lang="en-CA" b="1" dirty="0"/>
+              <a:t>interpret</a:t>
+            </a:r>
+            <a:r>
+              <a:rPr lang="en-CA" dirty="0"/>
+              <a:t>.</a:t>
+            </a:r>
+          </a:p>
+          <a:p>
+            <a:pPr lvl="1"/>
+            <a:r>
+              <a:rPr lang="en-CA" dirty="0"/>
+              <a:t>Commands must be properly formatted</a:t>
+            </a:r>
+          </a:p>
+          <a:p>
+            <a:pPr lvl="1"/>
+            <a:r>
+              <a:rPr lang="en-CA" dirty="0"/>
+              <a:t>Do “A”, then do “B”, </a:t>
+            </a:r>
+            <a:r>
+              <a:rPr lang="en-CA" dirty="0" err="1"/>
+              <a:t>etc</a:t>
+            </a:r>
+            <a:r>
+              <a:rPr lang="en-CA" dirty="0"/>
+              <a:t>…</a:t>
+            </a:r>
+          </a:p>
+          <a:p>
+            <a:pPr lvl="1"/>
+            <a:endParaRPr lang="en-CA" dirty="0"/>
+          </a:p>
+          <a:p>
+            <a:r>
+              <a:rPr lang="en-CA" dirty="0">
+                <a:highlight>
+                  <a:srgbClr val="FFFF00"/>
+                </a:highlight>
+              </a:rPr>
+              <a:t>Orders are executed in a </a:t>
+            </a:r>
+            <a:r>
+              <a:rPr lang="en-CA" b="1" dirty="0">
+                <a:highlight>
+                  <a:srgbClr val="FFFF00"/>
+                </a:highlight>
+              </a:rPr>
+              <a:t>sequential</a:t>
+            </a:r>
+            <a:r>
+              <a:rPr lang="en-CA" dirty="0">
+                <a:highlight>
+                  <a:srgbClr val="FFFF00"/>
+                </a:highlight>
+              </a:rPr>
+              <a:t> manner.</a:t>
+            </a:r>
+          </a:p>
+          <a:p>
+            <a:pPr lvl="1"/>
+            <a:r>
+              <a:rPr lang="en-CA" dirty="0"/>
+              <a:t>If you write “A” then “B”, the computer will execute “A” before “B”</a:t>
+            </a:r>
+          </a:p>
+          <a:p>
+            <a:endParaRPr lang="en-CA" dirty="0"/>
+          </a:p>
+          <a:p>
+            <a:r>
+              <a:rPr lang="en-CA" dirty="0"/>
+              <a:t>Computers can </a:t>
+            </a:r>
+            <a:r>
+              <a:rPr lang="en-CA" b="1" dirty="0"/>
+              <a:t>store data in variables </a:t>
+            </a:r>
+            <a:r>
+              <a:rPr lang="en-CA" dirty="0"/>
+              <a:t>for later use. </a:t>
+            </a:r>
+          </a:p>
+          <a:p>
+            <a:pPr lvl="1"/>
+            <a:endParaRPr lang="en-CA" dirty="0"/>
+          </a:p>
+          <a:p>
+            <a:r>
+              <a:rPr lang="en-CA" dirty="0"/>
+              <a:t>Computers can </a:t>
+            </a:r>
+            <a:r>
+              <a:rPr lang="en-CA" b="1" dirty="0"/>
+              <a:t>operate on data </a:t>
+            </a:r>
+            <a:r>
+              <a:rPr lang="en-CA" dirty="0"/>
+              <a:t>(addition, subtraction, comparison, </a:t>
+            </a:r>
+            <a:r>
+              <a:rPr lang="en-CA" dirty="0" err="1"/>
+              <a:t>etc</a:t>
+            </a:r>
+            <a:r>
+              <a:rPr lang="en-CA" dirty="0"/>
+              <a:t>…)</a:t>
+            </a:r>
+            <a:endParaRPr lang="en-CA" b="1" dirty="0"/>
+          </a:p>
+          <a:p>
+            <a:endParaRPr lang="en-CA" dirty="0"/>
+          </a:p>
+        </p:txBody>
+      </p:sp>
+    </p:spTree>
+    <p:extLst>
+      <p:ext uri="{BB962C8B-B14F-4D97-AF65-F5344CB8AC3E}">
+        <p14:creationId xmlns:p14="http://schemas.microsoft.com/office/powerpoint/2010/main" val="446825165"/>
+      </p:ext>
+    </p:extLst>
+  </p:cSld>
+  <p:clrMapOvr>
+    <a:masterClrMapping/>
+  </p:clrMapOvr>
+</p:sld>
+</file>
+
+<file path=ppt/slides/slide11.xml><?xml version="1.0" encoding="utf-8"?>
+<p:sld xmlns:a="http://schemas.openxmlformats.org/drawingml/2006/main" xmlns:r="http://schemas.openxmlformats.org/officeDocument/2006/relationships" xmlns:p="http://schemas.openxmlformats.org/presentationml/2006/main">
+  <p:cSld>
+    <p:spTree>
+      <p:nvGrpSpPr>
+        <p:cNvPr id="1" name=""/>
+        <p:cNvGrpSpPr/>
+        <p:nvPr/>
+      </p:nvGrpSpPr>
+      <p:grpSpPr>
+        <a:xfrm>
+          <a:off x="0" y="0"/>
+          <a:ext cx="0" cy="0"/>
+          <a:chOff x="0" y="0"/>
+          <a:chExt cx="0" cy="0"/>
+        </a:xfrm>
+      </p:grpSpPr>
+      <p:sp>
+        <p:nvSpPr>
+          <p:cNvPr id="2" name="Title 1">
+            <a:extLst>
+              <a:ext uri="{FF2B5EF4-FFF2-40B4-BE49-F238E27FC236}">
+                <a16:creationId xmlns:a16="http://schemas.microsoft.com/office/drawing/2014/main" id="{60DB5C85-2F84-4CC2-B37C-AA122B11A227}"/>
+              </a:ext>
+            </a:extLst>
+          </p:cNvPr>
+          <p:cNvSpPr>
+            <a:spLocks noGrp="1"/>
+          </p:cNvSpPr>
+          <p:nvPr>
+            <p:ph type="title"/>
+          </p:nvPr>
+        </p:nvSpPr>
+        <p:spPr/>
+        <p:txBody>
+          <a:bodyPr/>
+          <a:lstStyle/>
+          <a:p>
+            <a:r>
+              <a:rPr lang="en-CA" dirty="0"/>
+              <a:t>Control statements: if else</a:t>
+            </a:r>
+          </a:p>
+        </p:txBody>
+      </p:sp>
+      <p:sp>
+        <p:nvSpPr>
+          <p:cNvPr id="3" name="Content Placeholder 2">
+            <a:extLst>
+              <a:ext uri="{FF2B5EF4-FFF2-40B4-BE49-F238E27FC236}">
+                <a16:creationId xmlns:a16="http://schemas.microsoft.com/office/drawing/2014/main" id="{AE6A6611-A826-4ADD-A6AD-D04C1E83E5AD}"/>
+              </a:ext>
+            </a:extLst>
+          </p:cNvPr>
+          <p:cNvSpPr>
+            <a:spLocks noGrp="1"/>
+          </p:cNvSpPr>
+          <p:nvPr>
+            <p:ph sz="half" idx="1"/>
+          </p:nvPr>
+        </p:nvSpPr>
+        <p:spPr>
+          <a:xfrm>
+            <a:off x="914400" y="2141537"/>
+            <a:ext cx="5181600" cy="4351338"/>
+          </a:xfrm>
+        </p:spPr>
+        <p:txBody>
+          <a:bodyPr>
+            <a:normAutofit fontScale="92500" lnSpcReduction="10000"/>
+          </a:bodyPr>
+          <a:lstStyle/>
+          <a:p>
+            <a:pPr marL="0" indent="0">
+              <a:buNone/>
+            </a:pPr>
+            <a:r>
+              <a:rPr lang="en-CA" dirty="0"/>
+              <a:t>if (Boolean expression) </a:t>
+            </a:r>
+          </a:p>
+          <a:p>
+            <a:pPr marL="0" indent="0">
+              <a:buNone/>
+            </a:pPr>
+            <a:r>
+              <a:rPr lang="en-CA" dirty="0"/>
+              <a:t>{</a:t>
+            </a:r>
+          </a:p>
+          <a:p>
+            <a:pPr marL="0" indent="0">
+              <a:buNone/>
+            </a:pPr>
+            <a:r>
+              <a:rPr lang="en-CA" dirty="0"/>
+              <a:t>	//run this if the Boolean 	//expression is true</a:t>
+            </a:r>
+          </a:p>
+          <a:p>
+            <a:pPr marL="0" indent="0">
+              <a:buNone/>
+            </a:pPr>
+            <a:r>
+              <a:rPr lang="en-CA" dirty="0"/>
+              <a:t>}</a:t>
+            </a:r>
+          </a:p>
+          <a:p>
+            <a:pPr marL="0" indent="0">
+              <a:buNone/>
+            </a:pPr>
+            <a:r>
+              <a:rPr lang="en-CA" dirty="0"/>
+              <a:t>else</a:t>
+            </a:r>
+          </a:p>
+          <a:p>
+            <a:pPr marL="0" indent="0">
+              <a:buNone/>
+            </a:pPr>
+            <a:r>
+              <a:rPr lang="en-CA" dirty="0"/>
+              <a:t>{</a:t>
+            </a:r>
+          </a:p>
+          <a:p>
+            <a:pPr marL="0" indent="0">
+              <a:buNone/>
+            </a:pPr>
+            <a:r>
+              <a:rPr lang="en-CA" dirty="0"/>
+              <a:t>	//run this if the Boolean 	//expression is false</a:t>
+            </a:r>
+          </a:p>
+          <a:p>
+            <a:pPr marL="0" indent="0">
+              <a:buNone/>
+            </a:pPr>
+            <a:r>
+              <a:rPr lang="en-CA" dirty="0"/>
+              <a:t>}</a:t>
+            </a:r>
+          </a:p>
+        </p:txBody>
+      </p:sp>
+      <p:sp>
+        <p:nvSpPr>
+          <p:cNvPr id="4" name="Content Placeholder 3">
+            <a:extLst>
+              <a:ext uri="{FF2B5EF4-FFF2-40B4-BE49-F238E27FC236}">
+                <a16:creationId xmlns:a16="http://schemas.microsoft.com/office/drawing/2014/main" id="{4DA7939E-03F2-44B0-901D-EFF8BEC19297}"/>
+              </a:ext>
+            </a:extLst>
+          </p:cNvPr>
+          <p:cNvSpPr>
+            <a:spLocks noGrp="1"/>
+          </p:cNvSpPr>
+          <p:nvPr>
+            <p:ph sz="half" idx="2"/>
+          </p:nvPr>
+        </p:nvSpPr>
+        <p:spPr>
+          <a:xfrm>
+            <a:off x="6248400" y="2141537"/>
+            <a:ext cx="5181600" cy="4351338"/>
+          </a:xfrm>
+        </p:spPr>
+        <p:txBody>
+          <a:bodyPr>
+            <a:normAutofit fontScale="92500" lnSpcReduction="10000"/>
+          </a:bodyPr>
+          <a:lstStyle/>
+          <a:p>
+            <a:pPr marL="0" indent="0">
+              <a:buNone/>
+            </a:pPr>
+            <a:r>
+              <a:rPr lang="en-CA" dirty="0">
+                <a:solidFill>
+                  <a:schemeClr val="tx1">
+                    <a:lumMod val="50000"/>
+                    <a:lumOff val="50000"/>
+                  </a:schemeClr>
+                </a:solidFill>
+              </a:rPr>
+              <a:t>ex:</a:t>
+            </a:r>
+            <a:br>
+              <a:rPr lang="en-CA" dirty="0">
+                <a:solidFill>
+                  <a:schemeClr val="tx1">
+                    <a:lumMod val="50000"/>
+                    <a:lumOff val="50000"/>
+                  </a:schemeClr>
+                </a:solidFill>
+              </a:rPr>
+            </a:br>
+            <a:r>
+              <a:rPr lang="en-CA" dirty="0">
+                <a:solidFill>
+                  <a:schemeClr val="tx1">
+                    <a:lumMod val="50000"/>
+                    <a:lumOff val="50000"/>
+                  </a:schemeClr>
+                </a:solidFill>
+              </a:rPr>
+              <a:t>int x = 5;</a:t>
+            </a:r>
+          </a:p>
+          <a:p>
+            <a:pPr marL="0" indent="0">
+              <a:buNone/>
+            </a:pPr>
+            <a:r>
+              <a:rPr lang="en-CA" dirty="0">
+                <a:solidFill>
+                  <a:schemeClr val="tx1">
+                    <a:lumMod val="50000"/>
+                    <a:lumOff val="50000"/>
+                  </a:schemeClr>
+                </a:solidFill>
+              </a:rPr>
+              <a:t>if (x &lt; 3)</a:t>
+            </a:r>
+          </a:p>
+          <a:p>
+            <a:pPr marL="0" indent="0">
+              <a:buNone/>
+            </a:pPr>
+            <a:r>
+              <a:rPr lang="en-CA" dirty="0">
+                <a:solidFill>
+                  <a:schemeClr val="tx1">
+                    <a:lumMod val="50000"/>
+                    <a:lumOff val="50000"/>
+                  </a:schemeClr>
+                </a:solidFill>
+              </a:rPr>
+              <a:t>{</a:t>
+            </a:r>
+          </a:p>
+          <a:p>
+            <a:pPr marL="0" indent="0">
+              <a:buNone/>
+            </a:pPr>
+            <a:r>
+              <a:rPr lang="en-CA" dirty="0">
+                <a:solidFill>
+                  <a:schemeClr val="tx1">
+                    <a:lumMod val="50000"/>
+                    <a:lumOff val="50000"/>
+                  </a:schemeClr>
+                </a:solidFill>
+              </a:rPr>
+              <a:t>	</a:t>
+            </a:r>
+            <a:r>
+              <a:rPr lang="en-CA" dirty="0" err="1">
+                <a:solidFill>
+                  <a:schemeClr val="tx1">
+                    <a:lumMod val="50000"/>
+                    <a:lumOff val="50000"/>
+                  </a:schemeClr>
+                </a:solidFill>
+              </a:rPr>
+              <a:t>printf</a:t>
+            </a:r>
+            <a:r>
+              <a:rPr lang="en-CA" dirty="0">
+                <a:solidFill>
+                  <a:schemeClr val="tx1">
+                    <a:lumMod val="50000"/>
+                    <a:lumOff val="50000"/>
+                  </a:schemeClr>
+                </a:solidFill>
+              </a:rPr>
+              <a:t>(“This will not print”);</a:t>
+            </a:r>
+          </a:p>
+          <a:p>
+            <a:pPr marL="0" indent="0">
+              <a:buNone/>
+            </a:pPr>
+            <a:r>
+              <a:rPr lang="en-CA" dirty="0">
+                <a:solidFill>
+                  <a:schemeClr val="tx1">
+                    <a:lumMod val="50000"/>
+                    <a:lumOff val="50000"/>
+                  </a:schemeClr>
+                </a:solidFill>
+              </a:rPr>
+              <a:t>}</a:t>
+            </a:r>
+          </a:p>
+          <a:p>
+            <a:pPr marL="0" indent="0">
+              <a:buNone/>
+            </a:pPr>
+            <a:r>
+              <a:rPr lang="en-CA" dirty="0">
+                <a:solidFill>
+                  <a:schemeClr val="tx1">
+                    <a:lumMod val="50000"/>
+                    <a:lumOff val="50000"/>
+                  </a:schemeClr>
+                </a:solidFill>
+              </a:rPr>
+              <a:t>else</a:t>
+            </a:r>
+          </a:p>
+          <a:p>
+            <a:pPr marL="0" indent="0">
+              <a:buNone/>
+            </a:pPr>
+            <a:r>
+              <a:rPr lang="en-CA" dirty="0">
+                <a:solidFill>
+                  <a:schemeClr val="tx1">
+                    <a:lumMod val="50000"/>
+                    <a:lumOff val="50000"/>
+                  </a:schemeClr>
+                </a:solidFill>
+              </a:rPr>
+              <a:t>{</a:t>
+            </a:r>
+          </a:p>
+          <a:p>
+            <a:pPr marL="0" indent="0">
+              <a:buNone/>
+            </a:pPr>
+            <a:r>
+              <a:rPr lang="en-CA" dirty="0">
+                <a:solidFill>
+                  <a:schemeClr val="tx1">
+                    <a:lumMod val="50000"/>
+                    <a:lumOff val="50000"/>
+                  </a:schemeClr>
+                </a:solidFill>
+              </a:rPr>
+              <a:t>	</a:t>
+            </a:r>
+            <a:r>
+              <a:rPr lang="en-CA" dirty="0" err="1">
+                <a:solidFill>
+                  <a:schemeClr val="tx1">
+                    <a:lumMod val="50000"/>
+                    <a:lumOff val="50000"/>
+                  </a:schemeClr>
+                </a:solidFill>
+              </a:rPr>
+              <a:t>printf</a:t>
+            </a:r>
+            <a:r>
+              <a:rPr lang="en-CA" dirty="0">
+                <a:solidFill>
+                  <a:schemeClr val="tx1">
+                    <a:lumMod val="50000"/>
+                    <a:lumOff val="50000"/>
+                  </a:schemeClr>
+                </a:solidFill>
+              </a:rPr>
+              <a:t>(“This will print”);</a:t>
+            </a:r>
+          </a:p>
+          <a:p>
+            <a:pPr marL="0" indent="0">
+              <a:buNone/>
+            </a:pPr>
+            <a:r>
+              <a:rPr lang="en-CA" dirty="0">
+                <a:solidFill>
+                  <a:schemeClr val="tx1">
+                    <a:lumMod val="50000"/>
+                    <a:lumOff val="50000"/>
+                  </a:schemeClr>
+                </a:solidFill>
+              </a:rPr>
+              <a:t>}</a:t>
+            </a:r>
+          </a:p>
+        </p:txBody>
+      </p:sp>
+    </p:spTree>
+    <p:extLst>
+      <p:ext uri="{BB962C8B-B14F-4D97-AF65-F5344CB8AC3E}">
+        <p14:creationId xmlns:p14="http://schemas.microsoft.com/office/powerpoint/2010/main" val="1614740626"/>
+      </p:ext>
+    </p:extLst>
+  </p:cSld>
+  <p:clrMapOvr>
+    <a:masterClrMapping/>
+  </p:clrMapOvr>
+</p:sld>
+</file>
+
+<file path=ppt/slides/slide12.xml><?xml version="1.0" encoding="utf-8"?>
+<p:sld xmlns:a="http://schemas.openxmlformats.org/drawingml/2006/main" xmlns:r="http://schemas.openxmlformats.org/officeDocument/2006/relationships" xmlns:p="http://schemas.openxmlformats.org/presentationml/2006/main">
+  <p:cSld>
+    <p:spTree>
+      <p:nvGrpSpPr>
+        <p:cNvPr id="1" name=""/>
+        <p:cNvGrpSpPr/>
+        <p:nvPr/>
+      </p:nvGrpSpPr>
+      <p:grpSpPr>
+        <a:xfrm>
+          <a:off x="0" y="0"/>
+          <a:ext cx="0" cy="0"/>
+          <a:chOff x="0" y="0"/>
+          <a:chExt cx="0" cy="0"/>
+        </a:xfrm>
+      </p:grpSpPr>
+      <p:sp>
+        <p:nvSpPr>
+          <p:cNvPr id="2" name="Title 1">
+            <a:extLst>
+              <a:ext uri="{FF2B5EF4-FFF2-40B4-BE49-F238E27FC236}">
                 <a16:creationId xmlns:a16="http://schemas.microsoft.com/office/drawing/2014/main" id="{26FE62B9-4F3C-449E-B3F1-29BCEA248F73}"/>
               </a:ext>
             </a:extLst>
@@ -4747,13 +5814,13 @@
             <p:ph idx="1"/>
             <p:extLst>
               <p:ext uri="{D42A27DB-BD31-4B8C-83A1-F6EECF244321}">
-                <p14:modId xmlns:p14="http://schemas.microsoft.com/office/powerpoint/2010/main" val="2624583551"/>
+                <p14:modId xmlns:p14="http://schemas.microsoft.com/office/powerpoint/2010/main" val="1818905688"/>
               </p:ext>
             </p:extLst>
           </p:nvPr>
         </p:nvGraphicFramePr>
         <p:xfrm>
-          <a:off x="838200" y="1825625"/>
+          <a:off x="838200" y="2149182"/>
           <a:ext cx="10515600" cy="3708400"/>
         </p:xfrm>
         <a:graphic>
@@ -5399,7 +6466,7 @@
 </p:sld>
 </file>
 
-<file path=ppt/slides/slide11.xml><?xml version="1.0" encoding="utf-8"?>
+<file path=ppt/slides/slide13.xml><?xml version="1.0" encoding="utf-8"?>
 <p:sld xmlns:a="http://schemas.openxmlformats.org/drawingml/2006/main" xmlns:r="http://schemas.openxmlformats.org/officeDocument/2006/relationships" xmlns:p="http://schemas.openxmlformats.org/presentationml/2006/main">
   <p:cSld>
     <p:spTree>
@@ -5421,7 +6488,7 @@
           <p:cNvPr id="2" name="Title 1">
             <a:extLst>
               <a:ext uri="{FF2B5EF4-FFF2-40B4-BE49-F238E27FC236}">
-                <a16:creationId xmlns:a16="http://schemas.microsoft.com/office/drawing/2014/main" id="{BF57B442-50D3-4989-A0DF-3064765DEBE7}"/>
+                <a16:creationId xmlns:a16="http://schemas.microsoft.com/office/drawing/2014/main" id="{60DB5C85-2F84-4CC2-B37C-AA122B11A227}"/>
               </a:ext>
             </a:extLst>
           </p:cNvPr>
@@ -5434,12 +6501,14 @@
         </p:nvSpPr>
         <p:spPr/>
         <p:txBody>
-          <a:bodyPr/>
+          <a:bodyPr>
+            <a:normAutofit fontScale="90000"/>
+          </a:bodyPr>
           <a:lstStyle/>
           <a:p>
             <a:r>
               <a:rPr lang="en-CA" dirty="0"/>
-              <a:t>Programming in a nutshell…</a:t>
+              <a:t>Control statements: while loop</a:t>
             </a:r>
           </a:p>
         </p:txBody>
@@ -5449,7 +6518,7 @@
           <p:cNvPr id="3" name="Content Placeholder 2">
             <a:extLst>
               <a:ext uri="{FF2B5EF4-FFF2-40B4-BE49-F238E27FC236}">
-                <a16:creationId xmlns:a16="http://schemas.microsoft.com/office/drawing/2014/main" id="{2AEB2B98-FF3D-4A3C-8526-44B7EEB21B00}"/>
+                <a16:creationId xmlns:a16="http://schemas.microsoft.com/office/drawing/2014/main" id="{AE6A6611-A826-4ADD-A6AD-D04C1E83E5AD}"/>
               </a:ext>
             </a:extLst>
           </p:cNvPr>
@@ -5460,138 +6529,161 @@
             <p:ph idx="1"/>
           </p:nvPr>
         </p:nvSpPr>
-        <p:spPr/>
+        <p:spPr>
+          <a:xfrm>
+            <a:off x="838200" y="2096159"/>
+            <a:ext cx="10515600" cy="4351338"/>
+          </a:xfrm>
+        </p:spPr>
         <p:txBody>
           <a:bodyPr>
-            <a:normAutofit fontScale="92500"/>
+            <a:normAutofit fontScale="85000" lnSpcReduction="20000"/>
           </a:bodyPr>
           <a:lstStyle/>
           <a:p>
-            <a:r>
-              <a:rPr lang="en-CA" dirty="0"/>
-              <a:t>Write commands that the computer can </a:t>
-            </a:r>
-            <a:r>
-              <a:rPr lang="en-CA" b="1" dirty="0"/>
-              <a:t>interpret</a:t>
-            </a:r>
-            <a:r>
-              <a:rPr lang="en-CA" dirty="0"/>
-              <a:t>.</a:t>
-            </a:r>
-          </a:p>
-          <a:p>
-            <a:pPr lvl="1"/>
-            <a:r>
-              <a:rPr lang="en-CA" dirty="0"/>
-              <a:t>Commands must be properly formatted</a:t>
-            </a:r>
-          </a:p>
-          <a:p>
-            <a:pPr lvl="1"/>
-            <a:r>
-              <a:rPr lang="en-CA" dirty="0"/>
-              <a:t>Do “A”, then do “B”, </a:t>
-            </a:r>
-            <a:r>
-              <a:rPr lang="en-CA" dirty="0" err="1"/>
-              <a:t>etc</a:t>
-            </a:r>
-            <a:r>
-              <a:rPr lang="en-CA" dirty="0"/>
-              <a:t>…</a:t>
-            </a:r>
-          </a:p>
-          <a:p>
-            <a:pPr lvl="1"/>
+            <a:pPr marL="0" indent="0">
+              <a:buNone/>
+            </a:pPr>
+            <a:r>
+              <a:rPr lang="en-CA" dirty="0"/>
+              <a:t>while (Boolean expression)</a:t>
+            </a:r>
+          </a:p>
+          <a:p>
+            <a:pPr marL="0" indent="0">
+              <a:buNone/>
+            </a:pPr>
+            <a:r>
+              <a:rPr lang="en-CA" dirty="0"/>
+              <a:t>  {</a:t>
+            </a:r>
+          </a:p>
+          <a:p>
+            <a:pPr marL="0" indent="0">
+              <a:buNone/>
+            </a:pPr>
+            <a:r>
+              <a:rPr lang="en-CA" dirty="0"/>
+              <a:t>	//keep on running this code until the Boolean expression is false</a:t>
+            </a:r>
+          </a:p>
+          <a:p>
+            <a:pPr marL="0" indent="0">
+              <a:buNone/>
+            </a:pPr>
+            <a:r>
+              <a:rPr lang="en-CA" dirty="0"/>
+              <a:t>  }</a:t>
+            </a:r>
+          </a:p>
+          <a:p>
+            <a:pPr marL="0" indent="0">
+              <a:buNone/>
+            </a:pPr>
             <a:endParaRPr lang="en-CA" dirty="0"/>
           </a:p>
           <a:p>
+            <a:pPr marL="0" indent="0">
+              <a:buNone/>
+            </a:pPr>
             <a:r>
               <a:rPr lang="en-CA" dirty="0">
-                <a:highlight>
-                  <a:srgbClr val="FFFF00"/>
-                </a:highlight>
+                <a:solidFill>
+                  <a:schemeClr val="tx1">
+                    <a:lumMod val="50000"/>
+                    <a:lumOff val="50000"/>
+                  </a:schemeClr>
+                </a:solidFill>
               </a:rPr>
-              <a:t>Orders are executed in a </a:t>
-            </a:r>
-            <a:r>
-              <a:rPr lang="en-CA" b="1" dirty="0">
-                <a:highlight>
-                  <a:srgbClr val="FFFF00"/>
-                </a:highlight>
+              <a:t>ex: </a:t>
+            </a:r>
+          </a:p>
+          <a:p>
+            <a:pPr marL="0" indent="0">
+              <a:buNone/>
+            </a:pPr>
+            <a:r>
+              <a:rPr lang="en-CA" dirty="0">
+                <a:solidFill>
+                  <a:schemeClr val="tx1">
+                    <a:lumMod val="50000"/>
+                    <a:lumOff val="50000"/>
+                  </a:schemeClr>
+                </a:solidFill>
               </a:rPr>
-              <a:t>sequential</a:t>
-            </a:r>
+              <a:t>int counter = 0;</a:t>
+            </a:r>
+          </a:p>
+          <a:p>
+            <a:pPr marL="0" indent="0">
+              <a:buNone/>
+            </a:pPr>
             <a:r>
               <a:rPr lang="en-CA" dirty="0">
-                <a:highlight>
-                  <a:srgbClr val="FFFF00"/>
-                </a:highlight>
+                <a:solidFill>
+                  <a:schemeClr val="tx1">
+                    <a:lumMod val="50000"/>
+                    <a:lumOff val="50000"/>
+                  </a:schemeClr>
+                </a:solidFill>
               </a:rPr>
-              <a:t> manner.</a:t>
-            </a:r>
-          </a:p>
-          <a:p>
-            <a:pPr lvl="1"/>
-            <a:r>
-              <a:rPr lang="en-CA" dirty="0"/>
-              <a:t>If you write “A” then “B”, the computer will execute “A” before “B”</a:t>
-            </a:r>
-          </a:p>
-          <a:p>
-            <a:endParaRPr lang="en-CA" dirty="0"/>
-          </a:p>
-          <a:p>
-            <a:r>
-              <a:rPr lang="en-CA" dirty="0"/>
-              <a:t>Computers can </a:t>
-            </a:r>
-            <a:r>
-              <a:rPr lang="en-CA" b="1" dirty="0"/>
-              <a:t>store data in variables </a:t>
-            </a:r>
-            <a:r>
-              <a:rPr lang="en-CA" dirty="0"/>
-              <a:t>for later use. </a:t>
-            </a:r>
-          </a:p>
-          <a:p>
-            <a:pPr lvl="1"/>
-            <a:endParaRPr lang="en-CA" dirty="0"/>
-          </a:p>
-          <a:p>
-            <a:r>
-              <a:rPr lang="en-CA" dirty="0"/>
-              <a:t>Computers can </a:t>
-            </a:r>
-            <a:r>
-              <a:rPr lang="en-CA" b="1" dirty="0"/>
-              <a:t>operate on data </a:t>
-            </a:r>
-            <a:r>
-              <a:rPr lang="en-CA" dirty="0"/>
-              <a:t>(addition, subtraction, comparison, </a:t>
-            </a:r>
-            <a:r>
-              <a:rPr lang="en-CA" dirty="0" err="1"/>
-              <a:t>etc</a:t>
-            </a:r>
-            <a:r>
-              <a:rPr lang="en-CA" dirty="0"/>
-              <a:t>…)</a:t>
-            </a:r>
-            <a:endParaRPr lang="en-CA" b="1" dirty="0"/>
-          </a:p>
-          <a:p>
-            <a:endParaRPr lang="en-CA" dirty="0"/>
+              <a:t>while (counter &lt; 10)</a:t>
+            </a:r>
+          </a:p>
+          <a:p>
+            <a:pPr marL="0" indent="0">
+              <a:buNone/>
+            </a:pPr>
+            <a:r>
+              <a:rPr lang="en-CA" dirty="0">
+                <a:solidFill>
+                  <a:schemeClr val="tx1">
+                    <a:lumMod val="50000"/>
+                    <a:lumOff val="50000"/>
+                  </a:schemeClr>
+                </a:solidFill>
+              </a:rPr>
+              <a:t>{</a:t>
+            </a:r>
+          </a:p>
+          <a:p>
+            <a:pPr marL="0" indent="0">
+              <a:buNone/>
+            </a:pPr>
+            <a:r>
+              <a:rPr lang="en-CA" dirty="0">
+                <a:solidFill>
+                  <a:schemeClr val="tx1">
+                    <a:lumMod val="50000"/>
+                    <a:lumOff val="50000"/>
+                  </a:schemeClr>
+                </a:solidFill>
+              </a:rPr>
+              <a:t>	counter = counter + 1;</a:t>
+            </a:r>
+          </a:p>
+          <a:p>
+            <a:pPr marL="0" indent="0">
+              <a:buNone/>
+            </a:pPr>
+            <a:r>
+              <a:rPr lang="en-CA" dirty="0">
+                <a:solidFill>
+                  <a:schemeClr val="tx1">
+                    <a:lumMod val="50000"/>
+                    <a:lumOff val="50000"/>
+                  </a:schemeClr>
+                </a:solidFill>
+              </a:rPr>
+              <a:t>}</a:t>
+            </a:r>
           </a:p>
         </p:txBody>
       </p:sp>
     </p:spTree>
     <p:extLst>
       <p:ext uri="{BB962C8B-B14F-4D97-AF65-F5344CB8AC3E}">
-        <p14:creationId xmlns:p14="http://schemas.microsoft.com/office/powerpoint/2010/main" val="446825165"/>
+        <p14:creationId xmlns:p14="http://schemas.microsoft.com/office/powerpoint/2010/main" val="3723223229"/>
       </p:ext>
     </p:extLst>
   </p:cSld>
@@ -5601,7 +6693,245 @@
 </p:sld>
 </file>
 
-<file path=ppt/slides/slide12.xml><?xml version="1.0" encoding="utf-8"?>
+<file path=ppt/slides/slide14.xml><?xml version="1.0" encoding="utf-8"?>
+<p:sld xmlns:a="http://schemas.openxmlformats.org/drawingml/2006/main" xmlns:r="http://schemas.openxmlformats.org/officeDocument/2006/relationships" xmlns:p="http://schemas.openxmlformats.org/presentationml/2006/main">
+  <p:cSld>
+    <p:spTree>
+      <p:nvGrpSpPr>
+        <p:cNvPr id="1" name=""/>
+        <p:cNvGrpSpPr/>
+        <p:nvPr/>
+      </p:nvGrpSpPr>
+      <p:grpSpPr>
+        <a:xfrm>
+          <a:off x="0" y="0"/>
+          <a:ext cx="0" cy="0"/>
+          <a:chOff x="0" y="0"/>
+          <a:chExt cx="0" cy="0"/>
+        </a:xfrm>
+      </p:grpSpPr>
+      <p:sp>
+        <p:nvSpPr>
+          <p:cNvPr id="2" name="Title 1">
+            <a:extLst>
+              <a:ext uri="{FF2B5EF4-FFF2-40B4-BE49-F238E27FC236}">
+                <a16:creationId xmlns:a16="http://schemas.microsoft.com/office/drawing/2014/main" id="{34B8FA22-E46D-4A91-A51E-9367990F9C83}"/>
+              </a:ext>
+            </a:extLst>
+          </p:cNvPr>
+          <p:cNvSpPr>
+            <a:spLocks noGrp="1"/>
+          </p:cNvSpPr>
+          <p:nvPr>
+            <p:ph type="title"/>
+          </p:nvPr>
+        </p:nvSpPr>
+        <p:spPr/>
+        <p:txBody>
+          <a:bodyPr>
+            <a:normAutofit fontScale="90000"/>
+          </a:bodyPr>
+          <a:lstStyle/>
+          <a:p>
+            <a:r>
+              <a:rPr lang="en-CA" dirty="0"/>
+              <a:t>Control statements: for loop</a:t>
+            </a:r>
+          </a:p>
+        </p:txBody>
+      </p:sp>
+      <p:sp>
+        <p:nvSpPr>
+          <p:cNvPr id="3" name="Content Placeholder 2">
+            <a:extLst>
+              <a:ext uri="{FF2B5EF4-FFF2-40B4-BE49-F238E27FC236}">
+                <a16:creationId xmlns:a16="http://schemas.microsoft.com/office/drawing/2014/main" id="{76967E96-2A10-425C-A345-DDF272225F9A}"/>
+              </a:ext>
+            </a:extLst>
+          </p:cNvPr>
+          <p:cNvSpPr>
+            <a:spLocks noGrp="1"/>
+          </p:cNvSpPr>
+          <p:nvPr>
+            <p:ph idx="1"/>
+          </p:nvPr>
+        </p:nvSpPr>
+        <p:spPr>
+          <a:xfrm>
+            <a:off x="838200" y="2096159"/>
+            <a:ext cx="10515600" cy="4351338"/>
+          </a:xfrm>
+        </p:spPr>
+        <p:txBody>
+          <a:bodyPr>
+            <a:normAutofit fontScale="92500" lnSpcReduction="10000"/>
+          </a:bodyPr>
+          <a:lstStyle/>
+          <a:p>
+            <a:pPr marL="0" indent="0">
+              <a:buNone/>
+            </a:pPr>
+            <a:r>
+              <a:rPr lang="en-CA" dirty="0"/>
+              <a:t>for (declare counter; Boolean expression; change to counter)</a:t>
+            </a:r>
+          </a:p>
+          <a:p>
+            <a:pPr marL="0" indent="0">
+              <a:buNone/>
+            </a:pPr>
+            <a:r>
+              <a:rPr lang="en-CA" dirty="0"/>
+              <a:t>{</a:t>
+            </a:r>
+          </a:p>
+          <a:p>
+            <a:pPr marL="0" indent="0">
+              <a:buNone/>
+            </a:pPr>
+            <a:r>
+              <a:rPr lang="en-CA" dirty="0"/>
+              <a:t>	//run code until Boolean expression is false</a:t>
+            </a:r>
+          </a:p>
+          <a:p>
+            <a:pPr marL="0" indent="0">
+              <a:buNone/>
+            </a:pPr>
+            <a:r>
+              <a:rPr lang="en-CA" dirty="0"/>
+              <a:t>}</a:t>
+            </a:r>
+          </a:p>
+          <a:p>
+            <a:pPr marL="0" indent="0">
+              <a:buNone/>
+            </a:pPr>
+            <a:endParaRPr lang="en-CA" dirty="0"/>
+          </a:p>
+          <a:p>
+            <a:pPr marL="0" indent="0">
+              <a:buNone/>
+            </a:pPr>
+            <a:r>
+              <a:rPr lang="en-CA" dirty="0">
+                <a:solidFill>
+                  <a:schemeClr val="tx1">
+                    <a:lumMod val="50000"/>
+                    <a:lumOff val="50000"/>
+                  </a:schemeClr>
+                </a:solidFill>
+              </a:rPr>
+              <a:t>ex:</a:t>
+            </a:r>
+            <a:br>
+              <a:rPr lang="en-CA" dirty="0">
+                <a:solidFill>
+                  <a:schemeClr val="tx1">
+                    <a:lumMod val="50000"/>
+                    <a:lumOff val="50000"/>
+                  </a:schemeClr>
+                </a:solidFill>
+              </a:rPr>
+            </a:br>
+            <a:r>
+              <a:rPr lang="en-CA" dirty="0">
+                <a:solidFill>
+                  <a:schemeClr val="tx1">
+                    <a:lumMod val="50000"/>
+                    <a:lumOff val="50000"/>
+                  </a:schemeClr>
+                </a:solidFill>
+              </a:rPr>
+              <a:t>for (int counter = 0; counter &lt; 10; counter = counter+1)</a:t>
+            </a:r>
+          </a:p>
+          <a:p>
+            <a:pPr marL="0" indent="0">
+              <a:buNone/>
+            </a:pPr>
+            <a:r>
+              <a:rPr lang="en-CA" dirty="0">
+                <a:solidFill>
+                  <a:schemeClr val="tx1">
+                    <a:lumMod val="50000"/>
+                    <a:lumOff val="50000"/>
+                  </a:schemeClr>
+                </a:solidFill>
+              </a:rPr>
+              <a:t>{</a:t>
+            </a:r>
+          </a:p>
+          <a:p>
+            <a:pPr marL="0" indent="0">
+              <a:buNone/>
+            </a:pPr>
+            <a:r>
+              <a:rPr lang="en-CA" dirty="0">
+                <a:solidFill>
+                  <a:schemeClr val="tx1">
+                    <a:lumMod val="50000"/>
+                    <a:lumOff val="50000"/>
+                  </a:schemeClr>
+                </a:solidFill>
+              </a:rPr>
+              <a:t>	</a:t>
+            </a:r>
+            <a:r>
+              <a:rPr lang="en-CA" dirty="0" err="1">
+                <a:solidFill>
+                  <a:schemeClr val="tx1">
+                    <a:lumMod val="50000"/>
+                    <a:lumOff val="50000"/>
+                  </a:schemeClr>
+                </a:solidFill>
+              </a:rPr>
+              <a:t>printf</a:t>
+            </a:r>
+            <a:r>
+              <a:rPr lang="en-CA" dirty="0">
+                <a:solidFill>
+                  <a:schemeClr val="tx1">
+                    <a:lumMod val="50000"/>
+                    <a:lumOff val="50000"/>
+                  </a:schemeClr>
+                </a:solidFill>
+              </a:rPr>
+              <a:t>(“hello”);</a:t>
+            </a:r>
+          </a:p>
+          <a:p>
+            <a:pPr marL="0" indent="0">
+              <a:buNone/>
+            </a:pPr>
+            <a:r>
+              <a:rPr lang="en-CA" dirty="0">
+                <a:solidFill>
+                  <a:schemeClr val="tx1">
+                    <a:lumMod val="50000"/>
+                    <a:lumOff val="50000"/>
+                  </a:schemeClr>
+                </a:solidFill>
+              </a:rPr>
+              <a:t>}</a:t>
+            </a:r>
+          </a:p>
+        </p:txBody>
+      </p:sp>
+    </p:spTree>
+    <p:extLst>
+      <p:ext uri="{BB962C8B-B14F-4D97-AF65-F5344CB8AC3E}">
+        <p14:creationId xmlns:p14="http://schemas.microsoft.com/office/powerpoint/2010/main" val="504752768"/>
+      </p:ext>
+    </p:extLst>
+  </p:cSld>
+  <p:clrMapOvr>
+    <a:masterClrMapping/>
+  </p:clrMapOvr>
+</p:sld>
+</file>
+
+<file path=ppt/slides/slide15.xml><?xml version="1.0" encoding="utf-8"?>
 <p:sld xmlns:a="http://schemas.openxmlformats.org/drawingml/2006/main" xmlns:r="http://schemas.openxmlformats.org/officeDocument/2006/relationships" xmlns:p="http://schemas.openxmlformats.org/presentationml/2006/main">
   <p:cSld>
     <p:spTree>
@@ -5636,12 +6966,14 @@
         </p:nvSpPr>
         <p:spPr/>
         <p:txBody>
-          <a:bodyPr/>
+          <a:bodyPr>
+            <a:normAutofit/>
+          </a:bodyPr>
           <a:lstStyle/>
           <a:p>
             <a:r>
               <a:rPr lang="en-CA" dirty="0"/>
-              <a:t>Functions, libraries, and control statements</a:t>
+              <a:t>Functions, libraries, control statements</a:t>
             </a:r>
           </a:p>
         </p:txBody>
@@ -6905,844 +8237,6 @@
 </p:sld>
 </file>
 
-<file path=ppt/slides/slide13.xml><?xml version="1.0" encoding="utf-8"?>
-<p:sld xmlns:a="http://schemas.openxmlformats.org/drawingml/2006/main" xmlns:r="http://schemas.openxmlformats.org/officeDocument/2006/relationships" xmlns:p="http://schemas.openxmlformats.org/presentationml/2006/main">
-  <p:cSld>
-    <p:spTree>
-      <p:nvGrpSpPr>
-        <p:cNvPr id="1" name=""/>
-        <p:cNvGrpSpPr/>
-        <p:nvPr/>
-      </p:nvGrpSpPr>
-      <p:grpSpPr>
-        <a:xfrm>
-          <a:off x="0" y="0"/>
-          <a:ext cx="0" cy="0"/>
-          <a:chOff x="0" y="0"/>
-          <a:chExt cx="0" cy="0"/>
-        </a:xfrm>
-      </p:grpSpPr>
-      <p:sp>
-        <p:nvSpPr>
-          <p:cNvPr id="2" name="Title 1">
-            <a:extLst>
-              <a:ext uri="{FF2B5EF4-FFF2-40B4-BE49-F238E27FC236}">
-                <a16:creationId xmlns:a16="http://schemas.microsoft.com/office/drawing/2014/main" id="{60DB5C85-2F84-4CC2-B37C-AA122B11A227}"/>
-              </a:ext>
-            </a:extLst>
-          </p:cNvPr>
-          <p:cNvSpPr>
-            <a:spLocks noGrp="1"/>
-          </p:cNvSpPr>
-          <p:nvPr>
-            <p:ph type="title"/>
-          </p:nvPr>
-        </p:nvSpPr>
-        <p:spPr/>
-        <p:txBody>
-          <a:bodyPr/>
-          <a:lstStyle/>
-          <a:p>
-            <a:r>
-              <a:rPr lang="en-CA" dirty="0"/>
-              <a:t>Control statements: if else</a:t>
-            </a:r>
-          </a:p>
-        </p:txBody>
-      </p:sp>
-      <p:sp>
-        <p:nvSpPr>
-          <p:cNvPr id="3" name="Content Placeholder 2">
-            <a:extLst>
-              <a:ext uri="{FF2B5EF4-FFF2-40B4-BE49-F238E27FC236}">
-                <a16:creationId xmlns:a16="http://schemas.microsoft.com/office/drawing/2014/main" id="{AE6A6611-A826-4ADD-A6AD-D04C1E83E5AD}"/>
-              </a:ext>
-            </a:extLst>
-          </p:cNvPr>
-          <p:cNvSpPr>
-            <a:spLocks noGrp="1"/>
-          </p:cNvSpPr>
-          <p:nvPr>
-            <p:ph sz="half" idx="1"/>
-          </p:nvPr>
-        </p:nvSpPr>
-        <p:spPr/>
-        <p:txBody>
-          <a:bodyPr>
-            <a:normAutofit fontScale="92500" lnSpcReduction="10000"/>
-          </a:bodyPr>
-          <a:lstStyle/>
-          <a:p>
-            <a:pPr marL="0" indent="0">
-              <a:buNone/>
-            </a:pPr>
-            <a:r>
-              <a:rPr lang="en-CA" dirty="0"/>
-              <a:t>if (Boolean expression) </a:t>
-            </a:r>
-          </a:p>
-          <a:p>
-            <a:pPr marL="0" indent="0">
-              <a:buNone/>
-            </a:pPr>
-            <a:r>
-              <a:rPr lang="en-CA" dirty="0"/>
-              <a:t>{</a:t>
-            </a:r>
-          </a:p>
-          <a:p>
-            <a:pPr marL="0" indent="0">
-              <a:buNone/>
-            </a:pPr>
-            <a:r>
-              <a:rPr lang="en-CA" dirty="0"/>
-              <a:t>	//run this if the Boolean 	//expression is true</a:t>
-            </a:r>
-          </a:p>
-          <a:p>
-            <a:pPr marL="0" indent="0">
-              <a:buNone/>
-            </a:pPr>
-            <a:r>
-              <a:rPr lang="en-CA" dirty="0"/>
-              <a:t>}</a:t>
-            </a:r>
-          </a:p>
-          <a:p>
-            <a:pPr marL="0" indent="0">
-              <a:buNone/>
-            </a:pPr>
-            <a:r>
-              <a:rPr lang="en-CA" dirty="0"/>
-              <a:t>else</a:t>
-            </a:r>
-          </a:p>
-          <a:p>
-            <a:pPr marL="0" indent="0">
-              <a:buNone/>
-            </a:pPr>
-            <a:r>
-              <a:rPr lang="en-CA" dirty="0"/>
-              <a:t>{</a:t>
-            </a:r>
-          </a:p>
-          <a:p>
-            <a:pPr marL="0" indent="0">
-              <a:buNone/>
-            </a:pPr>
-            <a:r>
-              <a:rPr lang="en-CA" dirty="0"/>
-              <a:t>	//run this if the Boolean 	//expression is false</a:t>
-            </a:r>
-          </a:p>
-          <a:p>
-            <a:pPr marL="0" indent="0">
-              <a:buNone/>
-            </a:pPr>
-            <a:r>
-              <a:rPr lang="en-CA" dirty="0"/>
-              <a:t>}</a:t>
-            </a:r>
-          </a:p>
-        </p:txBody>
-      </p:sp>
-      <p:sp>
-        <p:nvSpPr>
-          <p:cNvPr id="4" name="Content Placeholder 3">
-            <a:extLst>
-              <a:ext uri="{FF2B5EF4-FFF2-40B4-BE49-F238E27FC236}">
-                <a16:creationId xmlns:a16="http://schemas.microsoft.com/office/drawing/2014/main" id="{4DA7939E-03F2-44B0-901D-EFF8BEC19297}"/>
-              </a:ext>
-            </a:extLst>
-          </p:cNvPr>
-          <p:cNvSpPr>
-            <a:spLocks noGrp="1"/>
-          </p:cNvSpPr>
-          <p:nvPr>
-            <p:ph sz="half" idx="2"/>
-          </p:nvPr>
-        </p:nvSpPr>
-        <p:spPr/>
-        <p:txBody>
-          <a:bodyPr>
-            <a:normAutofit fontScale="92500" lnSpcReduction="10000"/>
-          </a:bodyPr>
-          <a:lstStyle/>
-          <a:p>
-            <a:pPr marL="0" indent="0">
-              <a:buNone/>
-            </a:pPr>
-            <a:r>
-              <a:rPr lang="en-CA" dirty="0">
-                <a:solidFill>
-                  <a:schemeClr val="tx1">
-                    <a:lumMod val="50000"/>
-                    <a:lumOff val="50000"/>
-                  </a:schemeClr>
-                </a:solidFill>
-              </a:rPr>
-              <a:t>ex:</a:t>
-            </a:r>
-            <a:br>
-              <a:rPr lang="en-CA" dirty="0">
-                <a:solidFill>
-                  <a:schemeClr val="tx1">
-                    <a:lumMod val="50000"/>
-                    <a:lumOff val="50000"/>
-                  </a:schemeClr>
-                </a:solidFill>
-              </a:rPr>
-            </a:br>
-            <a:r>
-              <a:rPr lang="en-CA" dirty="0">
-                <a:solidFill>
-                  <a:schemeClr val="tx1">
-                    <a:lumMod val="50000"/>
-                    <a:lumOff val="50000"/>
-                  </a:schemeClr>
-                </a:solidFill>
-              </a:rPr>
-              <a:t>int x = 5;</a:t>
-            </a:r>
-          </a:p>
-          <a:p>
-            <a:pPr marL="0" indent="0">
-              <a:buNone/>
-            </a:pPr>
-            <a:r>
-              <a:rPr lang="en-CA" dirty="0">
-                <a:solidFill>
-                  <a:schemeClr val="tx1">
-                    <a:lumMod val="50000"/>
-                    <a:lumOff val="50000"/>
-                  </a:schemeClr>
-                </a:solidFill>
-              </a:rPr>
-              <a:t>if (x &lt; 3)</a:t>
-            </a:r>
-          </a:p>
-          <a:p>
-            <a:pPr marL="0" indent="0">
-              <a:buNone/>
-            </a:pPr>
-            <a:r>
-              <a:rPr lang="en-CA" dirty="0">
-                <a:solidFill>
-                  <a:schemeClr val="tx1">
-                    <a:lumMod val="50000"/>
-                    <a:lumOff val="50000"/>
-                  </a:schemeClr>
-                </a:solidFill>
-              </a:rPr>
-              <a:t>{</a:t>
-            </a:r>
-          </a:p>
-          <a:p>
-            <a:pPr marL="0" indent="0">
-              <a:buNone/>
-            </a:pPr>
-            <a:r>
-              <a:rPr lang="en-CA" dirty="0">
-                <a:solidFill>
-                  <a:schemeClr val="tx1">
-                    <a:lumMod val="50000"/>
-                    <a:lumOff val="50000"/>
-                  </a:schemeClr>
-                </a:solidFill>
-              </a:rPr>
-              <a:t>	</a:t>
-            </a:r>
-            <a:r>
-              <a:rPr lang="en-CA" dirty="0" err="1">
-                <a:solidFill>
-                  <a:schemeClr val="tx1">
-                    <a:lumMod val="50000"/>
-                    <a:lumOff val="50000"/>
-                  </a:schemeClr>
-                </a:solidFill>
-              </a:rPr>
-              <a:t>printf</a:t>
-            </a:r>
-            <a:r>
-              <a:rPr lang="en-CA" dirty="0">
-                <a:solidFill>
-                  <a:schemeClr val="tx1">
-                    <a:lumMod val="50000"/>
-                    <a:lumOff val="50000"/>
-                  </a:schemeClr>
-                </a:solidFill>
-              </a:rPr>
-              <a:t>(“This will not print”);</a:t>
-            </a:r>
-          </a:p>
-          <a:p>
-            <a:pPr marL="0" indent="0">
-              <a:buNone/>
-            </a:pPr>
-            <a:r>
-              <a:rPr lang="en-CA" dirty="0">
-                <a:solidFill>
-                  <a:schemeClr val="tx1">
-                    <a:lumMod val="50000"/>
-                    <a:lumOff val="50000"/>
-                  </a:schemeClr>
-                </a:solidFill>
-              </a:rPr>
-              <a:t>}</a:t>
-            </a:r>
-          </a:p>
-          <a:p>
-            <a:pPr marL="0" indent="0">
-              <a:buNone/>
-            </a:pPr>
-            <a:r>
-              <a:rPr lang="en-CA" dirty="0">
-                <a:solidFill>
-                  <a:schemeClr val="tx1">
-                    <a:lumMod val="50000"/>
-                    <a:lumOff val="50000"/>
-                  </a:schemeClr>
-                </a:solidFill>
-              </a:rPr>
-              <a:t>else</a:t>
-            </a:r>
-          </a:p>
-          <a:p>
-            <a:pPr marL="0" indent="0">
-              <a:buNone/>
-            </a:pPr>
-            <a:r>
-              <a:rPr lang="en-CA" dirty="0">
-                <a:solidFill>
-                  <a:schemeClr val="tx1">
-                    <a:lumMod val="50000"/>
-                    <a:lumOff val="50000"/>
-                  </a:schemeClr>
-                </a:solidFill>
-              </a:rPr>
-              <a:t>{</a:t>
-            </a:r>
-          </a:p>
-          <a:p>
-            <a:pPr marL="0" indent="0">
-              <a:buNone/>
-            </a:pPr>
-            <a:r>
-              <a:rPr lang="en-CA" dirty="0">
-                <a:solidFill>
-                  <a:schemeClr val="tx1">
-                    <a:lumMod val="50000"/>
-                    <a:lumOff val="50000"/>
-                  </a:schemeClr>
-                </a:solidFill>
-              </a:rPr>
-              <a:t>	</a:t>
-            </a:r>
-            <a:r>
-              <a:rPr lang="en-CA" dirty="0" err="1">
-                <a:solidFill>
-                  <a:schemeClr val="tx1">
-                    <a:lumMod val="50000"/>
-                    <a:lumOff val="50000"/>
-                  </a:schemeClr>
-                </a:solidFill>
-              </a:rPr>
-              <a:t>printf</a:t>
-            </a:r>
-            <a:r>
-              <a:rPr lang="en-CA" dirty="0">
-                <a:solidFill>
-                  <a:schemeClr val="tx1">
-                    <a:lumMod val="50000"/>
-                    <a:lumOff val="50000"/>
-                  </a:schemeClr>
-                </a:solidFill>
-              </a:rPr>
-              <a:t>(“This will print”);</a:t>
-            </a:r>
-          </a:p>
-          <a:p>
-            <a:pPr marL="0" indent="0">
-              <a:buNone/>
-            </a:pPr>
-            <a:r>
-              <a:rPr lang="en-CA" dirty="0">
-                <a:solidFill>
-                  <a:schemeClr val="tx1">
-                    <a:lumMod val="50000"/>
-                    <a:lumOff val="50000"/>
-                  </a:schemeClr>
-                </a:solidFill>
-              </a:rPr>
-              <a:t>}</a:t>
-            </a:r>
-          </a:p>
-        </p:txBody>
-      </p:sp>
-    </p:spTree>
-    <p:extLst>
-      <p:ext uri="{BB962C8B-B14F-4D97-AF65-F5344CB8AC3E}">
-        <p14:creationId xmlns:p14="http://schemas.microsoft.com/office/powerpoint/2010/main" val="1614740626"/>
-      </p:ext>
-    </p:extLst>
-  </p:cSld>
-  <p:clrMapOvr>
-    <a:masterClrMapping/>
-  </p:clrMapOvr>
-</p:sld>
-</file>
-
-<file path=ppt/slides/slide14.xml><?xml version="1.0" encoding="utf-8"?>
-<p:sld xmlns:a="http://schemas.openxmlformats.org/drawingml/2006/main" xmlns:r="http://schemas.openxmlformats.org/officeDocument/2006/relationships" xmlns:p="http://schemas.openxmlformats.org/presentationml/2006/main">
-  <p:cSld>
-    <p:spTree>
-      <p:nvGrpSpPr>
-        <p:cNvPr id="1" name=""/>
-        <p:cNvGrpSpPr/>
-        <p:nvPr/>
-      </p:nvGrpSpPr>
-      <p:grpSpPr>
-        <a:xfrm>
-          <a:off x="0" y="0"/>
-          <a:ext cx="0" cy="0"/>
-          <a:chOff x="0" y="0"/>
-          <a:chExt cx="0" cy="0"/>
-        </a:xfrm>
-      </p:grpSpPr>
-      <p:sp>
-        <p:nvSpPr>
-          <p:cNvPr id="2" name="Title 1">
-            <a:extLst>
-              <a:ext uri="{FF2B5EF4-FFF2-40B4-BE49-F238E27FC236}">
-                <a16:creationId xmlns:a16="http://schemas.microsoft.com/office/drawing/2014/main" id="{60DB5C85-2F84-4CC2-B37C-AA122B11A227}"/>
-              </a:ext>
-            </a:extLst>
-          </p:cNvPr>
-          <p:cNvSpPr>
-            <a:spLocks noGrp="1"/>
-          </p:cNvSpPr>
-          <p:nvPr>
-            <p:ph type="title"/>
-          </p:nvPr>
-        </p:nvSpPr>
-        <p:spPr/>
-        <p:txBody>
-          <a:bodyPr/>
-          <a:lstStyle/>
-          <a:p>
-            <a:r>
-              <a:rPr lang="en-CA" dirty="0"/>
-              <a:t>Control statements: while loop</a:t>
-            </a:r>
-          </a:p>
-        </p:txBody>
-      </p:sp>
-      <p:sp>
-        <p:nvSpPr>
-          <p:cNvPr id="3" name="Content Placeholder 2">
-            <a:extLst>
-              <a:ext uri="{FF2B5EF4-FFF2-40B4-BE49-F238E27FC236}">
-                <a16:creationId xmlns:a16="http://schemas.microsoft.com/office/drawing/2014/main" id="{AE6A6611-A826-4ADD-A6AD-D04C1E83E5AD}"/>
-              </a:ext>
-            </a:extLst>
-          </p:cNvPr>
-          <p:cNvSpPr>
-            <a:spLocks noGrp="1"/>
-          </p:cNvSpPr>
-          <p:nvPr>
-            <p:ph idx="1"/>
-          </p:nvPr>
-        </p:nvSpPr>
-        <p:spPr/>
-        <p:txBody>
-          <a:bodyPr>
-            <a:normAutofit fontScale="85000" lnSpcReduction="20000"/>
-          </a:bodyPr>
-          <a:lstStyle/>
-          <a:p>
-            <a:pPr marL="0" indent="0">
-              <a:buNone/>
-            </a:pPr>
-            <a:r>
-              <a:rPr lang="en-CA" dirty="0"/>
-              <a:t>while (Boolean expression)</a:t>
-            </a:r>
-          </a:p>
-          <a:p>
-            <a:pPr marL="0" indent="0">
-              <a:buNone/>
-            </a:pPr>
-            <a:r>
-              <a:rPr lang="en-CA" dirty="0"/>
-              <a:t>  {</a:t>
-            </a:r>
-          </a:p>
-          <a:p>
-            <a:pPr marL="0" indent="0">
-              <a:buNone/>
-            </a:pPr>
-            <a:r>
-              <a:rPr lang="en-CA" dirty="0"/>
-              <a:t>	//keep on running this code until the Boolean expression is false</a:t>
-            </a:r>
-          </a:p>
-          <a:p>
-            <a:pPr marL="0" indent="0">
-              <a:buNone/>
-            </a:pPr>
-            <a:r>
-              <a:rPr lang="en-CA" dirty="0"/>
-              <a:t>  }</a:t>
-            </a:r>
-          </a:p>
-          <a:p>
-            <a:pPr marL="0" indent="0">
-              <a:buNone/>
-            </a:pPr>
-            <a:endParaRPr lang="en-CA" dirty="0"/>
-          </a:p>
-          <a:p>
-            <a:pPr marL="0" indent="0">
-              <a:buNone/>
-            </a:pPr>
-            <a:r>
-              <a:rPr lang="en-CA" dirty="0">
-                <a:solidFill>
-                  <a:schemeClr val="tx1">
-                    <a:lumMod val="50000"/>
-                    <a:lumOff val="50000"/>
-                  </a:schemeClr>
-                </a:solidFill>
-              </a:rPr>
-              <a:t>ex: </a:t>
-            </a:r>
-          </a:p>
-          <a:p>
-            <a:pPr marL="0" indent="0">
-              <a:buNone/>
-            </a:pPr>
-            <a:r>
-              <a:rPr lang="en-CA" dirty="0">
-                <a:solidFill>
-                  <a:schemeClr val="tx1">
-                    <a:lumMod val="50000"/>
-                    <a:lumOff val="50000"/>
-                  </a:schemeClr>
-                </a:solidFill>
-              </a:rPr>
-              <a:t>int counter = 0;</a:t>
-            </a:r>
-          </a:p>
-          <a:p>
-            <a:pPr marL="0" indent="0">
-              <a:buNone/>
-            </a:pPr>
-            <a:r>
-              <a:rPr lang="en-CA" dirty="0">
-                <a:solidFill>
-                  <a:schemeClr val="tx1">
-                    <a:lumMod val="50000"/>
-                    <a:lumOff val="50000"/>
-                  </a:schemeClr>
-                </a:solidFill>
-              </a:rPr>
-              <a:t>while (counter &lt; 10)</a:t>
-            </a:r>
-          </a:p>
-          <a:p>
-            <a:pPr marL="0" indent="0">
-              <a:buNone/>
-            </a:pPr>
-            <a:r>
-              <a:rPr lang="en-CA" dirty="0">
-                <a:solidFill>
-                  <a:schemeClr val="tx1">
-                    <a:lumMod val="50000"/>
-                    <a:lumOff val="50000"/>
-                  </a:schemeClr>
-                </a:solidFill>
-              </a:rPr>
-              <a:t>{</a:t>
-            </a:r>
-          </a:p>
-          <a:p>
-            <a:pPr marL="0" indent="0">
-              <a:buNone/>
-            </a:pPr>
-            <a:r>
-              <a:rPr lang="en-CA" dirty="0">
-                <a:solidFill>
-                  <a:schemeClr val="tx1">
-                    <a:lumMod val="50000"/>
-                    <a:lumOff val="50000"/>
-                  </a:schemeClr>
-                </a:solidFill>
-              </a:rPr>
-              <a:t>	counter = counter + 1;</a:t>
-            </a:r>
-          </a:p>
-          <a:p>
-            <a:pPr marL="0" indent="0">
-              <a:buNone/>
-            </a:pPr>
-            <a:r>
-              <a:rPr lang="en-CA" dirty="0">
-                <a:solidFill>
-                  <a:schemeClr val="tx1">
-                    <a:lumMod val="50000"/>
-                    <a:lumOff val="50000"/>
-                  </a:schemeClr>
-                </a:solidFill>
-              </a:rPr>
-              <a:t>}</a:t>
-            </a:r>
-          </a:p>
-        </p:txBody>
-      </p:sp>
-    </p:spTree>
-    <p:extLst>
-      <p:ext uri="{BB962C8B-B14F-4D97-AF65-F5344CB8AC3E}">
-        <p14:creationId xmlns:p14="http://schemas.microsoft.com/office/powerpoint/2010/main" val="3723223229"/>
-      </p:ext>
-    </p:extLst>
-  </p:cSld>
-  <p:clrMapOvr>
-    <a:masterClrMapping/>
-  </p:clrMapOvr>
-</p:sld>
-</file>
-
-<file path=ppt/slides/slide15.xml><?xml version="1.0" encoding="utf-8"?>
-<p:sld xmlns:a="http://schemas.openxmlformats.org/drawingml/2006/main" xmlns:r="http://schemas.openxmlformats.org/officeDocument/2006/relationships" xmlns:p="http://schemas.openxmlformats.org/presentationml/2006/main">
-  <p:cSld>
-    <p:spTree>
-      <p:nvGrpSpPr>
-        <p:cNvPr id="1" name=""/>
-        <p:cNvGrpSpPr/>
-        <p:nvPr/>
-      </p:nvGrpSpPr>
-      <p:grpSpPr>
-        <a:xfrm>
-          <a:off x="0" y="0"/>
-          <a:ext cx="0" cy="0"/>
-          <a:chOff x="0" y="0"/>
-          <a:chExt cx="0" cy="0"/>
-        </a:xfrm>
-      </p:grpSpPr>
-      <p:sp>
-        <p:nvSpPr>
-          <p:cNvPr id="2" name="Title 1">
-            <a:extLst>
-              <a:ext uri="{FF2B5EF4-FFF2-40B4-BE49-F238E27FC236}">
-                <a16:creationId xmlns:a16="http://schemas.microsoft.com/office/drawing/2014/main" id="{34B8FA22-E46D-4A91-A51E-9367990F9C83}"/>
-              </a:ext>
-            </a:extLst>
-          </p:cNvPr>
-          <p:cNvSpPr>
-            <a:spLocks noGrp="1"/>
-          </p:cNvSpPr>
-          <p:nvPr>
-            <p:ph type="title"/>
-          </p:nvPr>
-        </p:nvSpPr>
-        <p:spPr/>
-        <p:txBody>
-          <a:bodyPr/>
-          <a:lstStyle/>
-          <a:p>
-            <a:r>
-              <a:rPr lang="en-CA" dirty="0"/>
-              <a:t>Control statements: for loop</a:t>
-            </a:r>
-          </a:p>
-        </p:txBody>
-      </p:sp>
-      <p:sp>
-        <p:nvSpPr>
-          <p:cNvPr id="3" name="Content Placeholder 2">
-            <a:extLst>
-              <a:ext uri="{FF2B5EF4-FFF2-40B4-BE49-F238E27FC236}">
-                <a16:creationId xmlns:a16="http://schemas.microsoft.com/office/drawing/2014/main" id="{76967E96-2A10-425C-A345-DDF272225F9A}"/>
-              </a:ext>
-            </a:extLst>
-          </p:cNvPr>
-          <p:cNvSpPr>
-            <a:spLocks noGrp="1"/>
-          </p:cNvSpPr>
-          <p:nvPr>
-            <p:ph idx="1"/>
-          </p:nvPr>
-        </p:nvSpPr>
-        <p:spPr/>
-        <p:txBody>
-          <a:bodyPr>
-            <a:normAutofit fontScale="92500" lnSpcReduction="10000"/>
-          </a:bodyPr>
-          <a:lstStyle/>
-          <a:p>
-            <a:pPr marL="0" indent="0">
-              <a:buNone/>
-            </a:pPr>
-            <a:r>
-              <a:rPr lang="en-CA" dirty="0"/>
-              <a:t>for (declare counter; Boolean expression; change to counter)</a:t>
-            </a:r>
-          </a:p>
-          <a:p>
-            <a:pPr marL="0" indent="0">
-              <a:buNone/>
-            </a:pPr>
-            <a:r>
-              <a:rPr lang="en-CA" dirty="0"/>
-              <a:t>{</a:t>
-            </a:r>
-          </a:p>
-          <a:p>
-            <a:pPr marL="0" indent="0">
-              <a:buNone/>
-            </a:pPr>
-            <a:r>
-              <a:rPr lang="en-CA" dirty="0"/>
-              <a:t>	//run code until Boolean expression is false</a:t>
-            </a:r>
-          </a:p>
-          <a:p>
-            <a:pPr marL="0" indent="0">
-              <a:buNone/>
-            </a:pPr>
-            <a:r>
-              <a:rPr lang="en-CA" dirty="0"/>
-              <a:t>}</a:t>
-            </a:r>
-          </a:p>
-          <a:p>
-            <a:pPr marL="0" indent="0">
-              <a:buNone/>
-            </a:pPr>
-            <a:endParaRPr lang="en-CA" dirty="0"/>
-          </a:p>
-          <a:p>
-            <a:pPr marL="0" indent="0">
-              <a:buNone/>
-            </a:pPr>
-            <a:r>
-              <a:rPr lang="en-CA" dirty="0">
-                <a:solidFill>
-                  <a:schemeClr val="tx1">
-                    <a:lumMod val="50000"/>
-                    <a:lumOff val="50000"/>
-                  </a:schemeClr>
-                </a:solidFill>
-              </a:rPr>
-              <a:t>ex:</a:t>
-            </a:r>
-            <a:br>
-              <a:rPr lang="en-CA" dirty="0">
-                <a:solidFill>
-                  <a:schemeClr val="tx1">
-                    <a:lumMod val="50000"/>
-                    <a:lumOff val="50000"/>
-                  </a:schemeClr>
-                </a:solidFill>
-              </a:rPr>
-            </a:br>
-            <a:r>
-              <a:rPr lang="en-CA" dirty="0">
-                <a:solidFill>
-                  <a:schemeClr val="tx1">
-                    <a:lumMod val="50000"/>
-                    <a:lumOff val="50000"/>
-                  </a:schemeClr>
-                </a:solidFill>
-              </a:rPr>
-              <a:t>for (int counter = 0; counter &lt; 10; counter = counter+1)</a:t>
-            </a:r>
-          </a:p>
-          <a:p>
-            <a:pPr marL="0" indent="0">
-              <a:buNone/>
-            </a:pPr>
-            <a:r>
-              <a:rPr lang="en-CA" dirty="0">
-                <a:solidFill>
-                  <a:schemeClr val="tx1">
-                    <a:lumMod val="50000"/>
-                    <a:lumOff val="50000"/>
-                  </a:schemeClr>
-                </a:solidFill>
-              </a:rPr>
-              <a:t>{</a:t>
-            </a:r>
-          </a:p>
-          <a:p>
-            <a:pPr marL="0" indent="0">
-              <a:buNone/>
-            </a:pPr>
-            <a:r>
-              <a:rPr lang="en-CA" dirty="0">
-                <a:solidFill>
-                  <a:schemeClr val="tx1">
-                    <a:lumMod val="50000"/>
-                    <a:lumOff val="50000"/>
-                  </a:schemeClr>
-                </a:solidFill>
-              </a:rPr>
-              <a:t>	</a:t>
-            </a:r>
-            <a:r>
-              <a:rPr lang="en-CA" dirty="0" err="1">
-                <a:solidFill>
-                  <a:schemeClr val="tx1">
-                    <a:lumMod val="50000"/>
-                    <a:lumOff val="50000"/>
-                  </a:schemeClr>
-                </a:solidFill>
-              </a:rPr>
-              <a:t>printf</a:t>
-            </a:r>
-            <a:r>
-              <a:rPr lang="en-CA" dirty="0">
-                <a:solidFill>
-                  <a:schemeClr val="tx1">
-                    <a:lumMod val="50000"/>
-                    <a:lumOff val="50000"/>
-                  </a:schemeClr>
-                </a:solidFill>
-              </a:rPr>
-              <a:t>(“hello”);</a:t>
-            </a:r>
-          </a:p>
-          <a:p>
-            <a:pPr marL="0" indent="0">
-              <a:buNone/>
-            </a:pPr>
-            <a:r>
-              <a:rPr lang="en-CA" dirty="0">
-                <a:solidFill>
-                  <a:schemeClr val="tx1">
-                    <a:lumMod val="50000"/>
-                    <a:lumOff val="50000"/>
-                  </a:schemeClr>
-                </a:solidFill>
-              </a:rPr>
-              <a:t>}</a:t>
-            </a:r>
-          </a:p>
-        </p:txBody>
-      </p:sp>
-    </p:spTree>
-    <p:extLst>
-      <p:ext uri="{BB962C8B-B14F-4D97-AF65-F5344CB8AC3E}">
-        <p14:creationId xmlns:p14="http://schemas.microsoft.com/office/powerpoint/2010/main" val="504752768"/>
-      </p:ext>
-    </p:extLst>
-  </p:cSld>
-  <p:clrMapOvr>
-    <a:masterClrMapping/>
-  </p:clrMapOvr>
-</p:sld>
-</file>
-
 <file path=ppt/slides/slide16.xml><?xml version="1.0" encoding="utf-8"?>
 <p:sld xmlns:a="http://schemas.openxmlformats.org/drawingml/2006/main" xmlns:r="http://schemas.openxmlformats.org/officeDocument/2006/relationships" xmlns:p="http://schemas.openxmlformats.org/presentationml/2006/main">
   <p:cSld>
@@ -7804,7 +8298,12 @@
             <p:ph idx="1"/>
           </p:nvPr>
         </p:nvSpPr>
-        <p:spPr/>
+        <p:spPr>
+          <a:xfrm>
+            <a:off x="838200" y="2019559"/>
+            <a:ext cx="10515600" cy="4351338"/>
+          </a:xfrm>
+        </p:spPr>
         <p:txBody>
           <a:bodyPr>
             <a:normAutofit fontScale="85000" lnSpcReduction="20000"/>
@@ -7956,16 +8455,18 @@
         </p:nvSpPr>
         <p:spPr>
           <a:xfrm>
-            <a:off x="838200" y="365125"/>
-            <a:ext cx="10515600" cy="746223"/>
+            <a:off x="3401449" y="702749"/>
+            <a:ext cx="4730261" cy="746223"/>
           </a:xfrm>
         </p:spPr>
         <p:txBody>
-          <a:bodyPr/>
+          <a:bodyPr>
+            <a:normAutofit/>
+          </a:bodyPr>
           <a:lstStyle/>
           <a:p>
             <a:r>
-              <a:rPr lang="en-CA" u="sng" dirty="0"/>
+              <a:rPr lang="en-CA" sz="4000" dirty="0"/>
               <a:t>Examples of functions</a:t>
             </a:r>
           </a:p>
@@ -7989,13 +8490,13 @@
         </p:nvSpPr>
         <p:spPr>
           <a:xfrm>
-            <a:off x="838200" y="1378634"/>
+            <a:off x="584980" y="2039816"/>
             <a:ext cx="5181600" cy="5114241"/>
           </a:xfrm>
         </p:spPr>
         <p:txBody>
           <a:bodyPr>
-            <a:normAutofit fontScale="77500" lnSpcReduction="20000"/>
+            <a:normAutofit fontScale="70000" lnSpcReduction="20000"/>
           </a:bodyPr>
           <a:lstStyle/>
           <a:p>
@@ -8170,13 +8671,13 @@
         </p:nvSpPr>
         <p:spPr>
           <a:xfrm>
-            <a:off x="6172200" y="1378634"/>
-            <a:ext cx="5181600" cy="5114241"/>
+            <a:off x="6425420" y="2039816"/>
+            <a:ext cx="5181600" cy="4958862"/>
           </a:xfrm>
         </p:spPr>
         <p:txBody>
           <a:bodyPr>
-            <a:normAutofit fontScale="77500" lnSpcReduction="20000"/>
+            <a:normAutofit fontScale="70000" lnSpcReduction="20000"/>
           </a:bodyPr>
           <a:lstStyle/>
           <a:p>
@@ -8433,7 +8934,7 @@
         </p:nvSpPr>
         <p:spPr>
           <a:xfrm>
-            <a:off x="838200" y="1825624"/>
+            <a:off x="838200" y="2124293"/>
             <a:ext cx="4817012" cy="4181281"/>
           </a:xfrm>
         </p:spPr>
@@ -8532,7 +9033,12 @@
             <p:ph sz="half" idx="2"/>
           </p:nvPr>
         </p:nvSpPr>
-        <p:spPr/>
+        <p:spPr>
+          <a:xfrm>
+            <a:off x="6172200" y="2124294"/>
+            <a:ext cx="5181600" cy="4351338"/>
+          </a:xfrm>
+        </p:spPr>
         <p:txBody>
           <a:bodyPr>
             <a:normAutofit fontScale="92500"/>
@@ -8669,7 +9175,12 @@
             <p:ph sz="half" idx="1"/>
           </p:nvPr>
         </p:nvSpPr>
-        <p:spPr/>
+        <p:spPr>
+          <a:xfrm>
+            <a:off x="805542" y="2141537"/>
+            <a:ext cx="5181600" cy="4351338"/>
+          </a:xfrm>
+        </p:spPr>
         <p:txBody>
           <a:bodyPr/>
           <a:lstStyle/>
@@ -9313,8 +9824,8 @@
         </p:blipFill>
         <p:spPr>
           <a:xfrm>
-            <a:off x="269865" y="1627713"/>
-            <a:ext cx="11499870" cy="5230287"/>
+            <a:off x="289676" y="1825625"/>
+            <a:ext cx="10759206" cy="5060510"/>
           </a:xfrm>
           <a:prstGeom prst="rect">
             <a:avLst/>
@@ -9761,7 +10272,9 @@
         </p:nvSpPr>
         <p:spPr/>
         <p:txBody>
-          <a:bodyPr/>
+          <a:bodyPr>
+            <a:normAutofit fontScale="90000"/>
+          </a:bodyPr>
           <a:lstStyle/>
           <a:p>
             <a:r>
@@ -10455,14 +10968,21 @@
             <p:ph type="title"/>
           </p:nvPr>
         </p:nvSpPr>
-        <p:spPr/>
+        <p:spPr>
+          <a:xfrm>
+            <a:off x="3396342" y="365125"/>
+            <a:ext cx="4545875" cy="1460500"/>
+          </a:xfrm>
+        </p:spPr>
         <p:txBody>
-          <a:bodyPr/>
+          <a:bodyPr>
+            <a:normAutofit fontScale="90000"/>
+          </a:bodyPr>
           <a:lstStyle/>
           <a:p>
             <a:r>
               <a:rPr lang="en-CA" dirty="0"/>
-              <a:t>Exercise: what are the final values of x and y? </a:t>
+              <a:t>Exercise: find the final values of x and y</a:t>
             </a:r>
           </a:p>
         </p:txBody>
@@ -10606,7 +11126,7 @@
             </a:pPr>
             <a:r>
               <a:rPr lang="en-CA" dirty="0"/>
-              <a:t>x = y + 4;</a:t>
+              <a:t>y = y – 4;</a:t>
             </a:r>
           </a:p>
           <a:p>
@@ -10616,7 +11136,7 @@
             </a:pPr>
             <a:r>
               <a:rPr lang="en-CA" dirty="0"/>
-              <a:t>y = y – 4;</a:t>
+              <a:t>x = y + 4;</a:t>
             </a:r>
           </a:p>
         </p:txBody>
@@ -10909,7 +11429,7 @@
             <p:ph idx="1"/>
             <p:extLst>
               <p:ext uri="{D42A27DB-BD31-4B8C-83A1-F6EECF244321}">
-                <p14:modId xmlns:p14="http://schemas.microsoft.com/office/powerpoint/2010/main" val="2333410089"/>
+                <p14:modId xmlns:p14="http://schemas.microsoft.com/office/powerpoint/2010/main" val="1739394134"/>
               </p:ext>
             </p:extLst>
           </p:nvPr>
@@ -11165,7 +11685,7 @@
                     <a:p>
                       <a:r>
                         <a:rPr lang="en-CA" dirty="0"/>
-                        <a:t>10 / 5 = 2</a:t>
+                        <a:t>5 / 2 = 2</a:t>
                       </a:r>
                     </a:p>
                   </a:txBody>
@@ -11211,7 +11731,7 @@
                     <a:p>
                       <a:r>
                         <a:rPr lang="en-CA" dirty="0"/>
-                        <a:t>10 % 5 = 0</a:t>
+                        <a:t>5 % 2 = 1</a:t>
                       </a:r>
                     </a:p>
                   </a:txBody>

</xml_diff>

<commit_message>
making the slides look nice.
</commit_message>
<xml_diff>
--- a/ECSE/Workshop-2/programming-1.pptx
+++ b/ECSE/Workshop-2/programming-1.pptx
@@ -129,6 +129,9 @@
   <p:extLst>
     <p:ext uri="{EFAFB233-063F-42B5-8137-9DF3F51BA10A}">
       <p15:sldGuideLst xmlns:p15="http://schemas.microsoft.com/office/powerpoint/2012/main"/>
+    </p:ext>
+    <p:ext uri="{2D200454-40CA-4A62-9FC3-DE9A4176ACB9}">
+      <p15:notesGuideLst xmlns:p15="http://schemas.microsoft.com/office/powerpoint/2012/main"/>
     </p:ext>
   </p:extLst>
 </p:presentation>
@@ -838,7 +841,7 @@
           <a:p>
             <a:fld id="{EBDFBFC2-CE20-4704-8BA1-39CBFF4B92DF}" type="datetimeFigureOut">
               <a:rPr lang="en-CA" smtClean="0"/>
-              <a:t>2020-01-25</a:t>
+              <a:t>2020-01-26</a:t>
             </a:fld>
             <a:endParaRPr lang="en-CA"/>
           </a:p>
@@ -1522,7 +1525,7 @@
           <a:p>
             <a:fld id="{CB4ED598-43EB-408A-9236-B45AB4DAC6D0}" type="datetimeFigureOut">
               <a:rPr lang="en-CA" smtClean="0"/>
-              <a:t>2020-01-25</a:t>
+              <a:t>2020-01-26</a:t>
             </a:fld>
             <a:endParaRPr lang="en-CA"/>
           </a:p>
@@ -1722,7 +1725,7 @@
           <a:p>
             <a:fld id="{CB4ED598-43EB-408A-9236-B45AB4DAC6D0}" type="datetimeFigureOut">
               <a:rPr lang="en-CA" smtClean="0"/>
-              <a:t>2020-01-25</a:t>
+              <a:t>2020-01-26</a:t>
             </a:fld>
             <a:endParaRPr lang="en-CA"/>
           </a:p>
@@ -1932,7 +1935,7 @@
           <a:p>
             <a:fld id="{CB4ED598-43EB-408A-9236-B45AB4DAC6D0}" type="datetimeFigureOut">
               <a:rPr lang="en-CA" smtClean="0"/>
-              <a:t>2020-01-25</a:t>
+              <a:t>2020-01-26</a:t>
             </a:fld>
             <a:endParaRPr lang="en-CA"/>
           </a:p>
@@ -2036,7 +2039,7 @@
         </p:nvGrpSpPr>
         <p:grpSpPr>
           <a:xfrm>
-            <a:off x="0" y="339000"/>
+            <a:off x="0" y="325937"/>
             <a:ext cx="8406063" cy="1480905"/>
             <a:chOff x="0" y="352062"/>
             <a:chExt cx="8406063" cy="1480905"/>
@@ -2250,7 +2253,7 @@
           <a:p>
             <a:fld id="{CB4ED598-43EB-408A-9236-B45AB4DAC6D0}" type="datetimeFigureOut">
               <a:rPr lang="en-CA" smtClean="0"/>
-              <a:t>2020-01-25</a:t>
+              <a:t>2020-01-26</a:t>
             </a:fld>
             <a:endParaRPr lang="en-CA"/>
           </a:p>
@@ -2526,7 +2529,7 @@
           <a:p>
             <a:fld id="{CB4ED598-43EB-408A-9236-B45AB4DAC6D0}" type="datetimeFigureOut">
               <a:rPr lang="en-CA" smtClean="0"/>
-              <a:t>2020-01-25</a:t>
+              <a:t>2020-01-26</a:t>
             </a:fld>
             <a:endParaRPr lang="en-CA"/>
           </a:p>
@@ -2907,7 +2910,7 @@
           <a:p>
             <a:fld id="{CB4ED598-43EB-408A-9236-B45AB4DAC6D0}" type="datetimeFigureOut">
               <a:rPr lang="en-CA" smtClean="0"/>
-              <a:t>2020-01-25</a:t>
+              <a:t>2020-01-26</a:t>
             </a:fld>
             <a:endParaRPr lang="en-CA"/>
           </a:p>
@@ -3322,7 +3325,7 @@
           <a:p>
             <a:fld id="{CB4ED598-43EB-408A-9236-B45AB4DAC6D0}" type="datetimeFigureOut">
               <a:rPr lang="en-CA" smtClean="0"/>
-              <a:t>2020-01-25</a:t>
+              <a:t>2020-01-26</a:t>
             </a:fld>
             <a:endParaRPr lang="en-CA"/>
           </a:p>
@@ -3464,7 +3467,7 @@
           <a:p>
             <a:fld id="{CB4ED598-43EB-408A-9236-B45AB4DAC6D0}" type="datetimeFigureOut">
               <a:rPr lang="en-CA" smtClean="0"/>
-              <a:t>2020-01-25</a:t>
+              <a:t>2020-01-26</a:t>
             </a:fld>
             <a:endParaRPr lang="en-CA"/>
           </a:p>
@@ -3577,7 +3580,7 @@
           <a:p>
             <a:fld id="{CB4ED598-43EB-408A-9236-B45AB4DAC6D0}" type="datetimeFigureOut">
               <a:rPr lang="en-CA" smtClean="0"/>
-              <a:t>2020-01-25</a:t>
+              <a:t>2020-01-26</a:t>
             </a:fld>
             <a:endParaRPr lang="en-CA"/>
           </a:p>
@@ -3890,7 +3893,7 @@
           <a:p>
             <a:fld id="{CB4ED598-43EB-408A-9236-B45AB4DAC6D0}" type="datetimeFigureOut">
               <a:rPr lang="en-CA" smtClean="0"/>
-              <a:t>2020-01-25</a:t>
+              <a:t>2020-01-26</a:t>
             </a:fld>
             <a:endParaRPr lang="en-CA"/>
           </a:p>
@@ -4179,7 +4182,7 @@
           <a:p>
             <a:fld id="{CB4ED598-43EB-408A-9236-B45AB4DAC6D0}" type="datetimeFigureOut">
               <a:rPr lang="en-CA" smtClean="0"/>
-              <a:t>2020-01-25</a:t>
+              <a:t>2020-01-26</a:t>
             </a:fld>
             <a:endParaRPr lang="en-CA"/>
           </a:p>
@@ -4422,7 +4425,7 @@
           <a:p>
             <a:fld id="{CB4ED598-43EB-408A-9236-B45AB4DAC6D0}" type="datetimeFigureOut">
               <a:rPr lang="en-CA" smtClean="0"/>
-              <a:t>2020-01-25</a:t>
+              <a:t>2020-01-26</a:t>
             </a:fld>
             <a:endParaRPr lang="en-CA"/>
           </a:p>
@@ -11429,13 +11432,13 @@
             <p:ph idx="1"/>
             <p:extLst>
               <p:ext uri="{D42A27DB-BD31-4B8C-83A1-F6EECF244321}">
-                <p14:modId xmlns:p14="http://schemas.microsoft.com/office/powerpoint/2010/main" val="1739394134"/>
+                <p14:modId xmlns:p14="http://schemas.microsoft.com/office/powerpoint/2010/main" val="2610548020"/>
               </p:ext>
             </p:extLst>
           </p:nvPr>
         </p:nvGraphicFramePr>
         <p:xfrm>
-          <a:off x="838200" y="1825625"/>
+          <a:off x="838201" y="2181860"/>
           <a:ext cx="10515597" cy="2494280"/>
         </p:xfrm>
         <a:graphic>

</xml_diff>